<commit_message>
Final version before seeing Johnny
</commit_message>
<xml_diff>
--- a/poster/OscarsPosterTemplateWhite.pptx
+++ b/poster/OscarsPosterTemplateWhite.pptx
@@ -3168,7 +3168,7 @@
               <a:graphicData uri="http://schemas.openxmlformats.org/presentationml/2006/ole">
                 <mc:AlternateContent xmlns:mc="http://schemas.openxmlformats.org/markup-compatibility/2006">
                   <mc:Choice xmlns:v="urn:schemas-microsoft-com:vml" Requires="v">
-                    <p:oleObj spid="_x0000_s1348" name="Image" r:id="rId8" imgW="1828440" imgH="1117440" progId="Photoshop.Image.13">
+                    <p:oleObj spid="_x0000_s1374" name="Image" r:id="rId8" imgW="1828440" imgH="1117440" progId="Photoshop.Image.13">
                       <p:embed/>
                     </p:oleObj>
                   </mc:Choice>
@@ -3225,7 +3225,7 @@
               <a:graphicData uri="http://schemas.openxmlformats.org/presentationml/2006/ole">
                 <mc:AlternateContent xmlns:mc="http://schemas.openxmlformats.org/markup-compatibility/2006">
                   <mc:Choice xmlns:v="urn:schemas-microsoft-com:vml" Requires="v">
-                    <p:oleObj spid="_x0000_s1349" name="Image" r:id="rId10" imgW="1828440" imgH="1117440" progId="Photoshop.Image.13">
+                    <p:oleObj spid="_x0000_s1375" name="Image" r:id="rId10" imgW="1828440" imgH="1117440" progId="Photoshop.Image.13">
                       <p:embed/>
                     </p:oleObj>
                   </mc:Choice>
@@ -4353,7 +4353,7 @@
             <a:graphicData uri="http://schemas.openxmlformats.org/presentationml/2006/ole">
               <mc:AlternateContent xmlns:mc="http://schemas.openxmlformats.org/markup-compatibility/2006">
                 <mc:Choice xmlns:v="urn:schemas-microsoft-com:vml" Requires="v">
-                  <p:oleObj spid="_x0000_s1350" name="Image" r:id="rId12" imgW="4571280" imgH="1688760" progId="Photoshop.Image.13">
+                  <p:oleObj spid="_x0000_s1376" name="Image" r:id="rId12" imgW="4571280" imgH="1688760" progId="Photoshop.Image.13">
                     <p:embed/>
                   </p:oleObj>
                 </mc:Choice>
@@ -4437,7 +4437,7 @@
             <a:graphicData uri="http://schemas.openxmlformats.org/presentationml/2006/ole">
               <mc:AlternateContent xmlns:mc="http://schemas.openxmlformats.org/markup-compatibility/2006">
                 <mc:Choice xmlns:v="urn:schemas-microsoft-com:vml" Requires="v">
-                  <p:oleObj spid="_x0000_s1351" name="Image" r:id="rId15" imgW="1574280" imgH="1053720" progId="Photoshop.Image.13">
+                  <p:oleObj spid="_x0000_s1377" name="Image" r:id="rId15" imgW="1574280" imgH="1053720" progId="Photoshop.Image.13">
                     <p:embed/>
                   </p:oleObj>
                 </mc:Choice>
@@ -5935,7 +5935,7 @@
           <a:bodyPr/>
           <a:lstStyle/>
           <a:p>
-            <a:pPr marL="342900" indent="-342900">
+            <a:pPr marL="342900" indent="-342900" algn="just">
               <a:buFont typeface="Arial"/>
               <a:buChar char="•"/>
             </a:pPr>
@@ -5980,6 +5980,7 @@
             </a:r>
           </a:p>
           <a:p>
+            <a:pPr algn="just"/>
             <a:endParaRPr lang="en-US" sz="2800" dirty="0" smtClean="0">
               <a:solidFill>
                 <a:schemeClr val="tx1">
@@ -5992,7 +5993,7 @@
             </a:endParaRPr>
           </a:p>
           <a:p>
-            <a:pPr marL="342900" indent="-342900">
+            <a:pPr marL="342900" indent="-342900" algn="just">
               <a:buFont typeface="Arial"/>
               <a:buChar char="•"/>
             </a:pPr>
@@ -6011,6 +6012,7 @@
             </a:r>
           </a:p>
           <a:p>
+            <a:pPr algn="just"/>
             <a:endParaRPr lang="en-US" sz="2800" dirty="0" smtClean="0">
               <a:solidFill>
                 <a:schemeClr val="tx1">
@@ -6023,7 +6025,7 @@
             </a:endParaRPr>
           </a:p>
           <a:p>
-            <a:pPr marL="342900" indent="-342900">
+            <a:pPr marL="342900" indent="-342900" algn="just">
               <a:buFont typeface="Arial"/>
               <a:buChar char="•"/>
             </a:pPr>
@@ -6117,6 +6119,7 @@
             </a:endParaRPr>
           </a:p>
           <a:p>
+            <a:pPr algn="just"/>
             <a:endParaRPr lang="en-US" sz="2800" dirty="0" smtClean="0">
               <a:solidFill>
                 <a:schemeClr val="tx1">
@@ -6129,7 +6132,7 @@
             </a:endParaRPr>
           </a:p>
           <a:p>
-            <a:pPr marL="342900" indent="-342900">
+            <a:pPr marL="342900" indent="-342900" algn="just">
               <a:buFont typeface="Arial"/>
               <a:buChar char="•"/>
             </a:pPr>
@@ -10359,7 +10362,7 @@
         </p:nvSpPr>
         <p:spPr>
           <a:xfrm>
-            <a:off x="32647350" y="26043399"/>
+            <a:off x="32850546" y="26026466"/>
             <a:ext cx="7045345" cy="954107"/>
           </a:xfrm>
           <a:prstGeom prst="rect">
@@ -10481,7 +10484,7 @@
         </p:nvSpPr>
         <p:spPr>
           <a:xfrm>
-            <a:off x="1634988" y="29097924"/>
+            <a:off x="1634988" y="29453524"/>
             <a:ext cx="6523657" cy="954107"/>
           </a:xfrm>
           <a:prstGeom prst="rect">
@@ -11328,7 +11331,7 @@
         </p:blipFill>
         <p:spPr>
           <a:xfrm>
-            <a:off x="769094" y="23474389"/>
+            <a:off x="769094" y="23728389"/>
             <a:ext cx="8229600" cy="5486400"/>
           </a:xfrm>
           <a:prstGeom prst="rect">
@@ -11503,7 +11506,7 @@
         </p:nvCxnSpPr>
         <p:spPr>
           <a:xfrm>
-            <a:off x="4470400" y="25583599"/>
+            <a:off x="4470400" y="25837599"/>
             <a:ext cx="1998133" cy="874734"/>
           </a:xfrm>
           <a:prstGeom prst="straightConnector1">
@@ -11827,7 +11830,7 @@
       </p:cxnSp>
       <p:pic>
         <p:nvPicPr>
-          <p:cNvPr id="2" name="Picture 1" descr="Rplot02.png"/>
+          <p:cNvPr id="4" name="Picture 3" descr="Rplot03.png"/>
           <p:cNvPicPr>
             <a:picLocks noChangeAspect="1"/>
           </p:cNvPicPr>
@@ -11847,57 +11850,14 @@
         </p:blipFill>
         <p:spPr>
           <a:xfrm>
-            <a:off x="769094" y="14628760"/>
-            <a:ext cx="8229600" cy="6181263"/>
+            <a:off x="769094" y="14678975"/>
+            <a:ext cx="8229600" cy="6086870"/>
           </a:xfrm>
           <a:prstGeom prst="rect">
             <a:avLst/>
           </a:prstGeom>
         </p:spPr>
       </p:pic>
-      <p:sp>
-        <p:nvSpPr>
-          <p:cNvPr id="3" name="TextBox 2"/>
-          <p:cNvSpPr txBox="1"/>
-          <p:nvPr/>
-        </p:nvSpPr>
-        <p:spPr>
-          <a:xfrm>
-            <a:off x="9023805" y="15407968"/>
-            <a:ext cx="430887" cy="4368143"/>
-          </a:xfrm>
-          <a:prstGeom prst="rect">
-            <a:avLst/>
-          </a:prstGeom>
-          <a:noFill/>
-        </p:spPr>
-        <p:txBody>
-          <a:bodyPr vert="vert" wrap="none" rtlCol="0">
-            <a:spAutoFit/>
-          </a:bodyPr>
-          <a:lstStyle/>
-          <a:p>
-            <a:r>
-              <a:rPr lang="en-US" sz="1600" b="1" dirty="0" err="1" smtClean="0">
-                <a:latin typeface="Century Gothic"/>
-                <a:cs typeface="Century Gothic"/>
-              </a:rPr>
-              <a:t>Barplot</a:t>
-            </a:r>
-            <a:r>
-              <a:rPr lang="en-US" sz="1600" b="1" dirty="0" smtClean="0">
-                <a:latin typeface="Century Gothic"/>
-                <a:cs typeface="Century Gothic"/>
-              </a:rPr>
-              <a:t> indicates number of tweets/100,000</a:t>
-            </a:r>
-            <a:endParaRPr lang="en-US" sz="1600" b="1" dirty="0">
-              <a:latin typeface="Century Gothic"/>
-              <a:cs typeface="Century Gothic"/>
-            </a:endParaRPr>
-          </a:p>
-        </p:txBody>
-      </p:sp>
     </p:spTree>
     <p:extLst>
       <p:ext uri="{BB962C8B-B14F-4D97-AF65-F5344CB8AC3E}">

</xml_diff>

<commit_message>
Adjusted based on Johnny's comments
</commit_message>
<xml_diff>
--- a/poster/OscarsPosterTemplateWhite.pptx
+++ b/poster/OscarsPosterTemplateWhite.pptx
@@ -3168,7 +3168,7 @@
               <a:graphicData uri="http://schemas.openxmlformats.org/presentationml/2006/ole">
                 <mc:AlternateContent xmlns:mc="http://schemas.openxmlformats.org/markup-compatibility/2006">
                   <mc:Choice xmlns:v="urn:schemas-microsoft-com:vml" Requires="v">
-                    <p:oleObj spid="_x0000_s1374" name="Image" r:id="rId8" imgW="1828440" imgH="1117440" progId="Photoshop.Image.13">
+                    <p:oleObj spid="_x0000_s1386" name="Image" r:id="rId8" imgW="1828440" imgH="1117440" progId="Photoshop.Image.13">
                       <p:embed/>
                     </p:oleObj>
                   </mc:Choice>
@@ -3225,7 +3225,7 @@
               <a:graphicData uri="http://schemas.openxmlformats.org/presentationml/2006/ole">
                 <mc:AlternateContent xmlns:mc="http://schemas.openxmlformats.org/markup-compatibility/2006">
                   <mc:Choice xmlns:v="urn:schemas-microsoft-com:vml" Requires="v">
-                    <p:oleObj spid="_x0000_s1375" name="Image" r:id="rId10" imgW="1828440" imgH="1117440" progId="Photoshop.Image.13">
+                    <p:oleObj spid="_x0000_s1387" name="Image" r:id="rId10" imgW="1828440" imgH="1117440" progId="Photoshop.Image.13">
                       <p:embed/>
                     </p:oleObj>
                   </mc:Choice>
@@ -4353,7 +4353,7 @@
             <a:graphicData uri="http://schemas.openxmlformats.org/presentationml/2006/ole">
               <mc:AlternateContent xmlns:mc="http://schemas.openxmlformats.org/markup-compatibility/2006">
                 <mc:Choice xmlns:v="urn:schemas-microsoft-com:vml" Requires="v">
-                  <p:oleObj spid="_x0000_s1376" name="Image" r:id="rId12" imgW="4571280" imgH="1688760" progId="Photoshop.Image.13">
+                  <p:oleObj spid="_x0000_s1388" name="Image" r:id="rId12" imgW="4571280" imgH="1688760" progId="Photoshop.Image.13">
                     <p:embed/>
                   </p:oleObj>
                 </mc:Choice>
@@ -4437,7 +4437,7 @@
             <a:graphicData uri="http://schemas.openxmlformats.org/presentationml/2006/ole">
               <mc:AlternateContent xmlns:mc="http://schemas.openxmlformats.org/markup-compatibility/2006">
                 <mc:Choice xmlns:v="urn:schemas-microsoft-com:vml" Requires="v">
-                  <p:oleObj spid="_x0000_s1377" name="Image" r:id="rId15" imgW="1574280" imgH="1053720" progId="Photoshop.Image.13">
+                  <p:oleObj spid="_x0000_s1389" name="Image" r:id="rId15" imgW="1574280" imgH="1053720" progId="Photoshop.Image.13">
                     <p:embed/>
                   </p:oleObj>
                 </mc:Choice>
@@ -6147,20 +6147,7 @@
                 <a:latin typeface="Century Gothic"/>
                 <a:cs typeface="Century Gothic"/>
               </a:rPr>
-              <a:t>And the Oscar goes to _____________________... </a:t>
-            </a:r>
-            <a:r>
-              <a:rPr lang="en-US" sz="2800" dirty="0" smtClean="0">
-                <a:solidFill>
-                  <a:schemeClr val="tx1">
-                    <a:lumMod val="85000"/>
-                    <a:lumOff val="15000"/>
-                  </a:schemeClr>
-                </a:solidFill>
-                <a:latin typeface="Century Gothic"/>
-                <a:cs typeface="Century Gothic"/>
-              </a:rPr>
-              <a:t>What movie do you think will win?</a:t>
+              <a:t>And the Oscar goes to _____________________... What movie do you think will win?</a:t>
             </a:r>
           </a:p>
         </p:txBody>
@@ -6784,7 +6771,7 @@
           <p:nvPr>
             <p:extLst>
               <p:ext uri="{D42A27DB-BD31-4B8C-83A1-F6EECF244321}">
-                <p14:modId xmlns:p14="http://schemas.microsoft.com/office/powerpoint/2010/main" val="2065885420"/>
+                <p14:modId xmlns:p14="http://schemas.microsoft.com/office/powerpoint/2010/main" val="1882175121"/>
               </p:ext>
             </p:extLst>
           </p:nvPr>
@@ -6815,14 +6802,7 @@
                           <a:latin typeface="Century Gothic"/>
                           <a:cs typeface="Century Gothic"/>
                         </a:rPr>
-                        <a:t>Positive</a:t>
-                      </a:r>
-                      <a:r>
-                        <a:rPr lang="en-US" sz="3200" dirty="0" smtClean="0">
-                          <a:latin typeface="Century Gothic"/>
-                          <a:cs typeface="Century Gothic"/>
-                        </a:rPr>
-                        <a:t> Tweets</a:t>
+                        <a:t>The Revenant</a:t>
                       </a:r>
                       <a:endParaRPr lang="en-US" sz="3200" dirty="0">
                         <a:latin typeface="Century Gothic"/>
@@ -6888,8 +6868,9 @@
                       <a:prstDash val="solid"/>
                     </a:lnBlToTr>
                     <a:solidFill>
-                      <a:schemeClr val="accent2">
+                      <a:schemeClr val="tx1">
                         <a:lumMod val="75000"/>
+                        <a:lumOff val="25000"/>
                       </a:schemeClr>
                     </a:solidFill>
                   </a:tcPr>
@@ -6905,14 +6886,7 @@
                           <a:latin typeface="Century Gothic"/>
                           <a:cs typeface="Century Gothic"/>
                         </a:rPr>
-                        <a:t>Negative</a:t>
-                      </a:r>
-                      <a:r>
-                        <a:rPr lang="en-US" sz="3200" dirty="0" smtClean="0">
-                          <a:latin typeface="Century Gothic"/>
-                          <a:cs typeface="Century Gothic"/>
-                        </a:rPr>
-                        <a:t> Tweets</a:t>
+                        <a:t>Spotlight</a:t>
                       </a:r>
                       <a:endParaRPr lang="en-US" sz="3200" dirty="0">
                         <a:latin typeface="Century Gothic"/>
@@ -6978,9 +6952,7 @@
                       <a:prstDash val="solid"/>
                     </a:lnBlToTr>
                     <a:solidFill>
-                      <a:schemeClr val="bg2">
-                        <a:lumMod val="50000"/>
-                      </a:schemeClr>
+                      <a:schemeClr val="accent2"/>
                     </a:solidFill>
                   </a:tcPr>
                 </a:tc>
@@ -6998,7 +6970,7 @@
           <p:nvPr>
             <p:extLst>
               <p:ext uri="{D42A27DB-BD31-4B8C-83A1-F6EECF244321}">
-                <p14:modId xmlns:p14="http://schemas.microsoft.com/office/powerpoint/2010/main" val="3610192312"/>
+                <p14:modId xmlns:p14="http://schemas.microsoft.com/office/powerpoint/2010/main" val="3770473715"/>
               </p:ext>
             </p:extLst>
           </p:nvPr>
@@ -7037,82 +7009,13 @@
                           <a:latin typeface="Century Gothic"/>
                           <a:cs typeface="Century Gothic"/>
                         </a:rPr>
-                        <a:t>Revenant</a:t>
+                        <a:t>Positive</a:t>
                       </a:r>
                       <a:endParaRPr lang="en-US" sz="2800" b="1" dirty="0">
                         <a:solidFill>
                           <a:schemeClr val="tx1">
                             <a:lumMod val="85000"/>
                             <a:lumOff val="15000"/>
-                          </a:schemeClr>
-                        </a:solidFill>
-                        <a:latin typeface="Century Gothic"/>
-                        <a:cs typeface="Century Gothic"/>
-                      </a:endParaRPr>
-                    </a:p>
-                  </a:txBody>
-                  <a:tcPr>
-                    <a:lnL w="12700" cap="flat" cmpd="sng" algn="ctr">
-                      <a:solidFill>
-                        <a:scrgbClr r="0" g="0" b="0"/>
-                      </a:solidFill>
-                      <a:prstDash val="solid"/>
-                      <a:round/>
-                      <a:headEnd type="none" w="med" len="med"/>
-                      <a:tailEnd type="none" w="med" len="med"/>
-                    </a:lnL>
-                    <a:lnR w="12700" cap="flat" cmpd="sng" algn="ctr">
-                      <a:solidFill>
-                        <a:scrgbClr r="0" g="0" b="0"/>
-                      </a:solidFill>
-                      <a:prstDash val="solid"/>
-                      <a:round/>
-                      <a:headEnd type="none" w="med" len="med"/>
-                      <a:tailEnd type="none" w="med" len="med"/>
-                    </a:lnR>
-                    <a:lnT w="12700" cap="flat" cmpd="sng" algn="ctr">
-                      <a:solidFill>
-                        <a:scrgbClr r="0" g="0" b="0"/>
-                      </a:solidFill>
-                      <a:prstDash val="solid"/>
-                      <a:round/>
-                      <a:headEnd type="none" w="med" len="med"/>
-                      <a:tailEnd type="none" w="med" len="med"/>
-                    </a:lnT>
-                    <a:lnB w="12700" cap="flat" cmpd="sng" algn="ctr">
-                      <a:solidFill>
-                        <a:scrgbClr r="0" g="0" b="0"/>
-                      </a:solidFill>
-                      <a:prstDash val="solid"/>
-                      <a:round/>
-                      <a:headEnd type="none" w="med" len="med"/>
-                      <a:tailEnd type="none" w="med" len="med"/>
-                    </a:lnB>
-                    <a:noFill/>
-                  </a:tcPr>
-                </a:tc>
-                <a:tc>
-                  <a:txBody>
-                    <a:bodyPr/>
-                    <a:lstStyle/>
-                    <a:p>
-                      <a:pPr algn="ctr"/>
-                      <a:r>
-                        <a:rPr lang="en-US" sz="3200" dirty="0" smtClean="0">
-                          <a:solidFill>
-                            <a:schemeClr val="accent4">
-                              <a:lumMod val="50000"/>
-                            </a:schemeClr>
-                          </a:solidFill>
-                          <a:latin typeface="Century Gothic"/>
-                          <a:cs typeface="Century Gothic"/>
-                        </a:rPr>
-                        <a:t>Spotlight</a:t>
-                      </a:r>
-                      <a:endParaRPr lang="en-US" sz="2800" dirty="0">
-                        <a:solidFill>
-                          <a:schemeClr val="accent4">
-                            <a:lumMod val="50000"/>
                           </a:schemeClr>
                         </a:solidFill>
                         <a:latin typeface="Century Gothic"/>
@@ -7177,13 +7080,82 @@
                           <a:latin typeface="Century Gothic"/>
                           <a:cs typeface="Century Gothic"/>
                         </a:rPr>
-                        <a:t>Revenant</a:t>
+                        <a:t>Negative</a:t>
                       </a:r>
                       <a:endParaRPr lang="en-US" sz="2800" dirty="0">
                         <a:solidFill>
                           <a:schemeClr val="tx1">
                             <a:lumMod val="85000"/>
                             <a:lumOff val="15000"/>
+                          </a:schemeClr>
+                        </a:solidFill>
+                        <a:latin typeface="Century Gothic"/>
+                        <a:cs typeface="Century Gothic"/>
+                      </a:endParaRPr>
+                    </a:p>
+                  </a:txBody>
+                  <a:tcPr>
+                    <a:lnL w="12700" cap="flat" cmpd="sng" algn="ctr">
+                      <a:solidFill>
+                        <a:scrgbClr r="0" g="0" b="0"/>
+                      </a:solidFill>
+                      <a:prstDash val="solid"/>
+                      <a:round/>
+                      <a:headEnd type="none" w="med" len="med"/>
+                      <a:tailEnd type="none" w="med" len="med"/>
+                    </a:lnL>
+                    <a:lnR w="12700" cap="flat" cmpd="sng" algn="ctr">
+                      <a:solidFill>
+                        <a:scrgbClr r="0" g="0" b="0"/>
+                      </a:solidFill>
+                      <a:prstDash val="solid"/>
+                      <a:round/>
+                      <a:headEnd type="none" w="med" len="med"/>
+                      <a:tailEnd type="none" w="med" len="med"/>
+                    </a:lnR>
+                    <a:lnT w="12700" cap="flat" cmpd="sng" algn="ctr">
+                      <a:solidFill>
+                        <a:scrgbClr r="0" g="0" b="0"/>
+                      </a:solidFill>
+                      <a:prstDash val="solid"/>
+                      <a:round/>
+                      <a:headEnd type="none" w="med" len="med"/>
+                      <a:tailEnd type="none" w="med" len="med"/>
+                    </a:lnT>
+                    <a:lnB w="12700" cap="flat" cmpd="sng" algn="ctr">
+                      <a:solidFill>
+                        <a:scrgbClr r="0" g="0" b="0"/>
+                      </a:solidFill>
+                      <a:prstDash val="solid"/>
+                      <a:round/>
+                      <a:headEnd type="none" w="med" len="med"/>
+                      <a:tailEnd type="none" w="med" len="med"/>
+                    </a:lnB>
+                    <a:noFill/>
+                  </a:tcPr>
+                </a:tc>
+                <a:tc>
+                  <a:txBody>
+                    <a:bodyPr/>
+                    <a:lstStyle/>
+                    <a:p>
+                      <a:pPr algn="ctr"/>
+                      <a:r>
+                        <a:rPr lang="en-US" sz="3200" dirty="0" smtClean="0">
+                          <a:solidFill>
+                            <a:schemeClr val="accent4">
+                              <a:lumMod val="50000"/>
+                            </a:schemeClr>
+                          </a:solidFill>
+                          <a:latin typeface="Century Gothic"/>
+                          <a:cs typeface="Century Gothic"/>
+                        </a:rPr>
+                        <a:t>Positive </a:t>
+                      </a:r>
+                      <a:endParaRPr lang="en-US" sz="2800" dirty="0">
+                        <a:solidFill>
+                          <a:schemeClr val="accent4">
+                            <a:lumMod val="50000"/>
                           </a:schemeClr>
                         </a:solidFill>
                         <a:latin typeface="Century Gothic"/>
@@ -7245,7 +7217,7 @@
                           <a:latin typeface="Century Gothic"/>
                           <a:cs typeface="Century Gothic"/>
                         </a:rPr>
-                        <a:t>Spotlight</a:t>
+                        <a:t>Negative</a:t>
                       </a:r>
                       <a:endParaRPr lang="en-US" sz="2800" dirty="0">
                         <a:solidFill>
@@ -7378,75 +7350,6 @@
                       <a:r>
                         <a:rPr lang="en-US" sz="2800" b="1" dirty="0" smtClean="0">
                           <a:solidFill>
-                            <a:schemeClr val="accent4">
-                              <a:lumMod val="50000"/>
-                            </a:schemeClr>
-                          </a:solidFill>
-                          <a:latin typeface="Century Gothic"/>
-                          <a:cs typeface="Century Gothic"/>
-                        </a:rPr>
-                        <a:t>cast</a:t>
-                      </a:r>
-                      <a:endParaRPr lang="en-US" sz="2800" b="1" dirty="0">
-                        <a:solidFill>
-                          <a:schemeClr val="accent4">
-                            <a:lumMod val="50000"/>
-                          </a:schemeClr>
-                        </a:solidFill>
-                        <a:latin typeface="Century Gothic"/>
-                        <a:cs typeface="Century Gothic"/>
-                      </a:endParaRPr>
-                    </a:p>
-                  </a:txBody>
-                  <a:tcPr>
-                    <a:lnL w="12700" cap="flat" cmpd="sng" algn="ctr">
-                      <a:solidFill>
-                        <a:scrgbClr r="0" g="0" b="0"/>
-                      </a:solidFill>
-                      <a:prstDash val="solid"/>
-                      <a:round/>
-                      <a:headEnd type="none" w="med" len="med"/>
-                      <a:tailEnd type="none" w="med" len="med"/>
-                    </a:lnL>
-                    <a:lnR w="12700" cap="flat" cmpd="sng" algn="ctr">
-                      <a:solidFill>
-                        <a:scrgbClr r="0" g="0" b="0"/>
-                      </a:solidFill>
-                      <a:prstDash val="solid"/>
-                      <a:round/>
-                      <a:headEnd type="none" w="med" len="med"/>
-                      <a:tailEnd type="none" w="med" len="med"/>
-                    </a:lnR>
-                    <a:lnT w="12700" cap="flat" cmpd="sng" algn="ctr">
-                      <a:solidFill>
-                        <a:scrgbClr r="0" g="0" b="0"/>
-                      </a:solidFill>
-                      <a:prstDash val="solid"/>
-                      <a:round/>
-                      <a:headEnd type="none" w="med" len="med"/>
-                      <a:tailEnd type="none" w="med" len="med"/>
-                    </a:lnT>
-                    <a:lnB w="12700" cap="flat" cmpd="sng" algn="ctr">
-                      <a:solidFill>
-                        <a:scrgbClr r="0" g="0" b="0"/>
-                      </a:solidFill>
-                      <a:prstDash val="solid"/>
-                      <a:round/>
-                      <a:headEnd type="none" w="med" len="med"/>
-                      <a:tailEnd type="none" w="med" len="med"/>
-                    </a:lnB>
-                    <a:noFill/>
-                  </a:tcPr>
-                </a:tc>
-                <a:tc>
-                  <a:txBody>
-                    <a:bodyPr/>
-                    <a:lstStyle/>
-                    <a:p>
-                      <a:pPr algn="ctr"/>
-                      <a:r>
-                        <a:rPr lang="en-US" sz="2800" b="1" dirty="0" smtClean="0">
-                          <a:solidFill>
                             <a:schemeClr val="tx1">
                               <a:lumMod val="85000"/>
                               <a:lumOff val="15000"/>
@@ -7462,6 +7365,75 @@
                           <a:schemeClr val="tx1">
                             <a:lumMod val="85000"/>
                             <a:lumOff val="15000"/>
+                          </a:schemeClr>
+                        </a:solidFill>
+                        <a:latin typeface="Century Gothic"/>
+                        <a:cs typeface="Century Gothic"/>
+                      </a:endParaRPr>
+                    </a:p>
+                  </a:txBody>
+                  <a:tcPr>
+                    <a:lnL w="12700" cap="flat" cmpd="sng" algn="ctr">
+                      <a:solidFill>
+                        <a:scrgbClr r="0" g="0" b="0"/>
+                      </a:solidFill>
+                      <a:prstDash val="solid"/>
+                      <a:round/>
+                      <a:headEnd type="none" w="med" len="med"/>
+                      <a:tailEnd type="none" w="med" len="med"/>
+                    </a:lnL>
+                    <a:lnR w="12700" cap="flat" cmpd="sng" algn="ctr">
+                      <a:solidFill>
+                        <a:scrgbClr r="0" g="0" b="0"/>
+                      </a:solidFill>
+                      <a:prstDash val="solid"/>
+                      <a:round/>
+                      <a:headEnd type="none" w="med" len="med"/>
+                      <a:tailEnd type="none" w="med" len="med"/>
+                    </a:lnR>
+                    <a:lnT w="12700" cap="flat" cmpd="sng" algn="ctr">
+                      <a:solidFill>
+                        <a:scrgbClr r="0" g="0" b="0"/>
+                      </a:solidFill>
+                      <a:prstDash val="solid"/>
+                      <a:round/>
+                      <a:headEnd type="none" w="med" len="med"/>
+                      <a:tailEnd type="none" w="med" len="med"/>
+                    </a:lnT>
+                    <a:lnB w="12700" cap="flat" cmpd="sng" algn="ctr">
+                      <a:solidFill>
+                        <a:scrgbClr r="0" g="0" b="0"/>
+                      </a:solidFill>
+                      <a:prstDash val="solid"/>
+                      <a:round/>
+                      <a:headEnd type="none" w="med" len="med"/>
+                      <a:tailEnd type="none" w="med" len="med"/>
+                    </a:lnB>
+                    <a:noFill/>
+                  </a:tcPr>
+                </a:tc>
+                <a:tc>
+                  <a:txBody>
+                    <a:bodyPr/>
+                    <a:lstStyle/>
+                    <a:p>
+                      <a:pPr algn="ctr"/>
+                      <a:r>
+                        <a:rPr lang="en-US" sz="2800" b="1" dirty="0" smtClean="0">
+                          <a:solidFill>
+                            <a:schemeClr val="accent4">
+                              <a:lumMod val="50000"/>
+                            </a:schemeClr>
+                          </a:solidFill>
+                          <a:latin typeface="Century Gothic"/>
+                          <a:cs typeface="Century Gothic"/>
+                        </a:rPr>
+                        <a:t>cast</a:t>
+                      </a:r>
+                      <a:endParaRPr lang="en-US" sz="2800" b="1" dirty="0">
+                        <a:solidFill>
+                          <a:schemeClr val="accent4">
+                            <a:lumMod val="50000"/>
                           </a:schemeClr>
                         </a:solidFill>
                         <a:latin typeface="Century Gothic"/>
@@ -7656,75 +7628,6 @@
                       <a:r>
                         <a:rPr lang="en-US" sz="2800" dirty="0" smtClean="0">
                           <a:solidFill>
-                            <a:schemeClr val="accent4">
-                              <a:lumMod val="50000"/>
-                            </a:schemeClr>
-                          </a:solidFill>
-                          <a:latin typeface="Century Gothic"/>
-                          <a:cs typeface="Century Gothic"/>
-                        </a:rPr>
-                        <a:t>outstanding</a:t>
-                      </a:r>
-                      <a:endParaRPr lang="en-US" sz="2800" dirty="0">
-                        <a:solidFill>
-                          <a:schemeClr val="accent4">
-                            <a:lumMod val="50000"/>
-                          </a:schemeClr>
-                        </a:solidFill>
-                        <a:latin typeface="Century Gothic"/>
-                        <a:cs typeface="Century Gothic"/>
-                      </a:endParaRPr>
-                    </a:p>
-                  </a:txBody>
-                  <a:tcPr>
-                    <a:lnL w="12700" cap="flat" cmpd="sng" algn="ctr">
-                      <a:solidFill>
-                        <a:scrgbClr r="0" g="0" b="0"/>
-                      </a:solidFill>
-                      <a:prstDash val="solid"/>
-                      <a:round/>
-                      <a:headEnd type="none" w="med" len="med"/>
-                      <a:tailEnd type="none" w="med" len="med"/>
-                    </a:lnL>
-                    <a:lnR w="12700" cap="flat" cmpd="sng" algn="ctr">
-                      <a:solidFill>
-                        <a:scrgbClr r="0" g="0" b="0"/>
-                      </a:solidFill>
-                      <a:prstDash val="solid"/>
-                      <a:round/>
-                      <a:headEnd type="none" w="med" len="med"/>
-                      <a:tailEnd type="none" w="med" len="med"/>
-                    </a:lnR>
-                    <a:lnT w="12700" cap="flat" cmpd="sng" algn="ctr">
-                      <a:solidFill>
-                        <a:scrgbClr r="0" g="0" b="0"/>
-                      </a:solidFill>
-                      <a:prstDash val="solid"/>
-                      <a:round/>
-                      <a:headEnd type="none" w="med" len="med"/>
-                      <a:tailEnd type="none" w="med" len="med"/>
-                    </a:lnT>
-                    <a:lnB w="12700" cap="flat" cmpd="sng" algn="ctr">
-                      <a:solidFill>
-                        <a:scrgbClr r="0" g="0" b="0"/>
-                      </a:solidFill>
-                      <a:prstDash val="solid"/>
-                      <a:round/>
-                      <a:headEnd type="none" w="med" len="med"/>
-                      <a:tailEnd type="none" w="med" len="med"/>
-                    </a:lnB>
-                    <a:noFill/>
-                  </a:tcPr>
-                </a:tc>
-                <a:tc>
-                  <a:txBody>
-                    <a:bodyPr/>
-                    <a:lstStyle/>
-                    <a:p>
-                      <a:pPr algn="ctr"/>
-                      <a:r>
-                        <a:rPr lang="en-US" sz="2800" dirty="0" smtClean="0">
-                          <a:solidFill>
                             <a:schemeClr val="tx1">
                               <a:lumMod val="85000"/>
                               <a:lumOff val="15000"/>
@@ -7740,6 +7643,75 @@
                           <a:schemeClr val="tx1">
                             <a:lumMod val="85000"/>
                             <a:lumOff val="15000"/>
+                          </a:schemeClr>
+                        </a:solidFill>
+                        <a:latin typeface="Century Gothic"/>
+                        <a:cs typeface="Century Gothic"/>
+                      </a:endParaRPr>
+                    </a:p>
+                  </a:txBody>
+                  <a:tcPr>
+                    <a:lnL w="12700" cap="flat" cmpd="sng" algn="ctr">
+                      <a:solidFill>
+                        <a:scrgbClr r="0" g="0" b="0"/>
+                      </a:solidFill>
+                      <a:prstDash val="solid"/>
+                      <a:round/>
+                      <a:headEnd type="none" w="med" len="med"/>
+                      <a:tailEnd type="none" w="med" len="med"/>
+                    </a:lnL>
+                    <a:lnR w="12700" cap="flat" cmpd="sng" algn="ctr">
+                      <a:solidFill>
+                        <a:scrgbClr r="0" g="0" b="0"/>
+                      </a:solidFill>
+                      <a:prstDash val="solid"/>
+                      <a:round/>
+                      <a:headEnd type="none" w="med" len="med"/>
+                      <a:tailEnd type="none" w="med" len="med"/>
+                    </a:lnR>
+                    <a:lnT w="12700" cap="flat" cmpd="sng" algn="ctr">
+                      <a:solidFill>
+                        <a:scrgbClr r="0" g="0" b="0"/>
+                      </a:solidFill>
+                      <a:prstDash val="solid"/>
+                      <a:round/>
+                      <a:headEnd type="none" w="med" len="med"/>
+                      <a:tailEnd type="none" w="med" len="med"/>
+                    </a:lnT>
+                    <a:lnB w="12700" cap="flat" cmpd="sng" algn="ctr">
+                      <a:solidFill>
+                        <a:scrgbClr r="0" g="0" b="0"/>
+                      </a:solidFill>
+                      <a:prstDash val="solid"/>
+                      <a:round/>
+                      <a:headEnd type="none" w="med" len="med"/>
+                      <a:tailEnd type="none" w="med" len="med"/>
+                    </a:lnB>
+                    <a:noFill/>
+                  </a:tcPr>
+                </a:tc>
+                <a:tc>
+                  <a:txBody>
+                    <a:bodyPr/>
+                    <a:lstStyle/>
+                    <a:p>
+                      <a:pPr algn="ctr"/>
+                      <a:r>
+                        <a:rPr lang="en-US" sz="2800" dirty="0" smtClean="0">
+                          <a:solidFill>
+                            <a:schemeClr val="accent4">
+                              <a:lumMod val="50000"/>
+                            </a:schemeClr>
+                          </a:solidFill>
+                          <a:latin typeface="Century Gothic"/>
+                          <a:cs typeface="Century Gothic"/>
+                        </a:rPr>
+                        <a:t>outstanding</a:t>
+                      </a:r>
+                      <a:endParaRPr lang="en-US" sz="2800" dirty="0">
+                        <a:solidFill>
+                          <a:schemeClr val="accent4">
+                            <a:lumMod val="50000"/>
                           </a:schemeClr>
                         </a:solidFill>
                         <a:latin typeface="Century Gothic"/>
@@ -7934,75 +7906,6 @@
                       <a:r>
                         <a:rPr lang="en-US" sz="2800" dirty="0" smtClean="0">
                           <a:solidFill>
-                            <a:schemeClr val="accent4">
-                              <a:lumMod val="50000"/>
-                            </a:schemeClr>
-                          </a:solidFill>
-                          <a:latin typeface="Century Gothic"/>
-                          <a:cs typeface="Century Gothic"/>
-                        </a:rPr>
-                        <a:t>motion</a:t>
-                      </a:r>
-                      <a:endParaRPr lang="en-US" sz="2800" dirty="0">
-                        <a:solidFill>
-                          <a:schemeClr val="accent4">
-                            <a:lumMod val="50000"/>
-                          </a:schemeClr>
-                        </a:solidFill>
-                        <a:latin typeface="Century Gothic"/>
-                        <a:cs typeface="Century Gothic"/>
-                      </a:endParaRPr>
-                    </a:p>
-                  </a:txBody>
-                  <a:tcPr>
-                    <a:lnL w="12700" cap="flat" cmpd="sng" algn="ctr">
-                      <a:solidFill>
-                        <a:scrgbClr r="0" g="0" b="0"/>
-                      </a:solidFill>
-                      <a:prstDash val="solid"/>
-                      <a:round/>
-                      <a:headEnd type="none" w="med" len="med"/>
-                      <a:tailEnd type="none" w="med" len="med"/>
-                    </a:lnL>
-                    <a:lnR w="12700" cap="flat" cmpd="sng" algn="ctr">
-                      <a:solidFill>
-                        <a:scrgbClr r="0" g="0" b="0"/>
-                      </a:solidFill>
-                      <a:prstDash val="solid"/>
-                      <a:round/>
-                      <a:headEnd type="none" w="med" len="med"/>
-                      <a:tailEnd type="none" w="med" len="med"/>
-                    </a:lnR>
-                    <a:lnT w="12700" cap="flat" cmpd="sng" algn="ctr">
-                      <a:solidFill>
-                        <a:scrgbClr r="0" g="0" b="0"/>
-                      </a:solidFill>
-                      <a:prstDash val="solid"/>
-                      <a:round/>
-                      <a:headEnd type="none" w="med" len="med"/>
-                      <a:tailEnd type="none" w="med" len="med"/>
-                    </a:lnT>
-                    <a:lnB w="12700" cap="flat" cmpd="sng" algn="ctr">
-                      <a:solidFill>
-                        <a:scrgbClr r="0" g="0" b="0"/>
-                      </a:solidFill>
-                      <a:prstDash val="solid"/>
-                      <a:round/>
-                      <a:headEnd type="none" w="med" len="med"/>
-                      <a:tailEnd type="none" w="med" len="med"/>
-                    </a:lnB>
-                    <a:noFill/>
-                  </a:tcPr>
-                </a:tc>
-                <a:tc>
-                  <a:txBody>
-                    <a:bodyPr/>
-                    <a:lstStyle/>
-                    <a:p>
-                      <a:pPr algn="ctr"/>
-                      <a:r>
-                        <a:rPr lang="en-US" sz="2800" dirty="0" smtClean="0">
-                          <a:solidFill>
                             <a:schemeClr val="tx1">
                               <a:lumMod val="85000"/>
                               <a:lumOff val="15000"/>
@@ -8018,6 +7921,75 @@
                           <a:schemeClr val="tx1">
                             <a:lumMod val="85000"/>
                             <a:lumOff val="15000"/>
+                          </a:schemeClr>
+                        </a:solidFill>
+                        <a:latin typeface="Century Gothic"/>
+                        <a:cs typeface="Century Gothic"/>
+                      </a:endParaRPr>
+                    </a:p>
+                  </a:txBody>
+                  <a:tcPr>
+                    <a:lnL w="12700" cap="flat" cmpd="sng" algn="ctr">
+                      <a:solidFill>
+                        <a:scrgbClr r="0" g="0" b="0"/>
+                      </a:solidFill>
+                      <a:prstDash val="solid"/>
+                      <a:round/>
+                      <a:headEnd type="none" w="med" len="med"/>
+                      <a:tailEnd type="none" w="med" len="med"/>
+                    </a:lnL>
+                    <a:lnR w="12700" cap="flat" cmpd="sng" algn="ctr">
+                      <a:solidFill>
+                        <a:scrgbClr r="0" g="0" b="0"/>
+                      </a:solidFill>
+                      <a:prstDash val="solid"/>
+                      <a:round/>
+                      <a:headEnd type="none" w="med" len="med"/>
+                      <a:tailEnd type="none" w="med" len="med"/>
+                    </a:lnR>
+                    <a:lnT w="12700" cap="flat" cmpd="sng" algn="ctr">
+                      <a:solidFill>
+                        <a:scrgbClr r="0" g="0" b="0"/>
+                      </a:solidFill>
+                      <a:prstDash val="solid"/>
+                      <a:round/>
+                      <a:headEnd type="none" w="med" len="med"/>
+                      <a:tailEnd type="none" w="med" len="med"/>
+                    </a:lnT>
+                    <a:lnB w="12700" cap="flat" cmpd="sng" algn="ctr">
+                      <a:solidFill>
+                        <a:scrgbClr r="0" g="0" b="0"/>
+                      </a:solidFill>
+                      <a:prstDash val="solid"/>
+                      <a:round/>
+                      <a:headEnd type="none" w="med" len="med"/>
+                      <a:tailEnd type="none" w="med" len="med"/>
+                    </a:lnB>
+                    <a:noFill/>
+                  </a:tcPr>
+                </a:tc>
+                <a:tc>
+                  <a:txBody>
+                    <a:bodyPr/>
+                    <a:lstStyle/>
+                    <a:p>
+                      <a:pPr algn="ctr"/>
+                      <a:r>
+                        <a:rPr lang="en-US" sz="2800" dirty="0" smtClean="0">
+                          <a:solidFill>
+                            <a:schemeClr val="accent4">
+                              <a:lumMod val="50000"/>
+                            </a:schemeClr>
+                          </a:solidFill>
+                          <a:latin typeface="Century Gothic"/>
+                          <a:cs typeface="Century Gothic"/>
+                        </a:rPr>
+                        <a:t>motion</a:t>
+                      </a:r>
+                      <a:endParaRPr lang="en-US" sz="2800" dirty="0">
+                        <a:solidFill>
+                          <a:schemeClr val="accent4">
+                            <a:lumMod val="50000"/>
                           </a:schemeClr>
                         </a:solidFill>
                         <a:latin typeface="Century Gothic"/>
@@ -8210,75 +8182,6 @@
                     <a:p>
                       <a:pPr algn="ctr"/>
                       <a:r>
-                        <a:rPr lang="en-US" sz="2800" dirty="0" smtClean="0">
-                          <a:solidFill>
-                            <a:schemeClr val="accent4">
-                              <a:lumMod val="50000"/>
-                            </a:schemeClr>
-                          </a:solidFill>
-                          <a:latin typeface="Century Gothic"/>
-                          <a:cs typeface="Century Gothic"/>
-                        </a:rPr>
-                        <a:t>sag</a:t>
-                      </a:r>
-                      <a:endParaRPr lang="en-US" sz="2800" dirty="0">
-                        <a:solidFill>
-                          <a:schemeClr val="accent4">
-                            <a:lumMod val="50000"/>
-                          </a:schemeClr>
-                        </a:solidFill>
-                        <a:latin typeface="Century Gothic"/>
-                        <a:cs typeface="Century Gothic"/>
-                      </a:endParaRPr>
-                    </a:p>
-                  </a:txBody>
-                  <a:tcPr>
-                    <a:lnL w="12700" cap="flat" cmpd="sng" algn="ctr">
-                      <a:solidFill>
-                        <a:scrgbClr r="0" g="0" b="0"/>
-                      </a:solidFill>
-                      <a:prstDash val="solid"/>
-                      <a:round/>
-                      <a:headEnd type="none" w="med" len="med"/>
-                      <a:tailEnd type="none" w="med" len="med"/>
-                    </a:lnL>
-                    <a:lnR w="12700" cap="flat" cmpd="sng" algn="ctr">
-                      <a:solidFill>
-                        <a:scrgbClr r="0" g="0" b="0"/>
-                      </a:solidFill>
-                      <a:prstDash val="solid"/>
-                      <a:round/>
-                      <a:headEnd type="none" w="med" len="med"/>
-                      <a:tailEnd type="none" w="med" len="med"/>
-                    </a:lnR>
-                    <a:lnT w="12700" cap="flat" cmpd="sng" algn="ctr">
-                      <a:solidFill>
-                        <a:scrgbClr r="0" g="0" b="0"/>
-                      </a:solidFill>
-                      <a:prstDash val="solid"/>
-                      <a:round/>
-                      <a:headEnd type="none" w="med" len="med"/>
-                      <a:tailEnd type="none" w="med" len="med"/>
-                    </a:lnT>
-                    <a:lnB w="12700" cap="flat" cmpd="sng" algn="ctr">
-                      <a:solidFill>
-                        <a:scrgbClr r="0" g="0" b="0"/>
-                      </a:solidFill>
-                      <a:prstDash val="solid"/>
-                      <a:round/>
-                      <a:headEnd type="none" w="med" len="med"/>
-                      <a:tailEnd type="none" w="med" len="med"/>
-                    </a:lnB>
-                    <a:noFill/>
-                  </a:tcPr>
-                </a:tc>
-                <a:tc>
-                  <a:txBody>
-                    <a:bodyPr/>
-                    <a:lstStyle/>
-                    <a:p>
-                      <a:pPr algn="ctr"/>
-                      <a:r>
                         <a:rPr lang="en-US" sz="2800" b="1" dirty="0" err="1" smtClean="0">
                           <a:solidFill>
                             <a:schemeClr val="tx1">
@@ -8296,6 +8199,75 @@
                           <a:schemeClr val="tx1">
                             <a:lumMod val="85000"/>
                             <a:lumOff val="15000"/>
+                          </a:schemeClr>
+                        </a:solidFill>
+                        <a:latin typeface="Century Gothic"/>
+                        <a:cs typeface="Century Gothic"/>
+                      </a:endParaRPr>
+                    </a:p>
+                  </a:txBody>
+                  <a:tcPr>
+                    <a:lnL w="12700" cap="flat" cmpd="sng" algn="ctr">
+                      <a:solidFill>
+                        <a:scrgbClr r="0" g="0" b="0"/>
+                      </a:solidFill>
+                      <a:prstDash val="solid"/>
+                      <a:round/>
+                      <a:headEnd type="none" w="med" len="med"/>
+                      <a:tailEnd type="none" w="med" len="med"/>
+                    </a:lnL>
+                    <a:lnR w="12700" cap="flat" cmpd="sng" algn="ctr">
+                      <a:solidFill>
+                        <a:scrgbClr r="0" g="0" b="0"/>
+                      </a:solidFill>
+                      <a:prstDash val="solid"/>
+                      <a:round/>
+                      <a:headEnd type="none" w="med" len="med"/>
+                      <a:tailEnd type="none" w="med" len="med"/>
+                    </a:lnR>
+                    <a:lnT w="12700" cap="flat" cmpd="sng" algn="ctr">
+                      <a:solidFill>
+                        <a:scrgbClr r="0" g="0" b="0"/>
+                      </a:solidFill>
+                      <a:prstDash val="solid"/>
+                      <a:round/>
+                      <a:headEnd type="none" w="med" len="med"/>
+                      <a:tailEnd type="none" w="med" len="med"/>
+                    </a:lnT>
+                    <a:lnB w="12700" cap="flat" cmpd="sng" algn="ctr">
+                      <a:solidFill>
+                        <a:scrgbClr r="0" g="0" b="0"/>
+                      </a:solidFill>
+                      <a:prstDash val="solid"/>
+                      <a:round/>
+                      <a:headEnd type="none" w="med" len="med"/>
+                      <a:tailEnd type="none" w="med" len="med"/>
+                    </a:lnB>
+                    <a:noFill/>
+                  </a:tcPr>
+                </a:tc>
+                <a:tc>
+                  <a:txBody>
+                    <a:bodyPr/>
+                    <a:lstStyle/>
+                    <a:p>
+                      <a:pPr algn="ctr"/>
+                      <a:r>
+                        <a:rPr lang="en-US" sz="2800" dirty="0" smtClean="0">
+                          <a:solidFill>
+                            <a:schemeClr val="accent4">
+                              <a:lumMod val="50000"/>
+                            </a:schemeClr>
+                          </a:solidFill>
+                          <a:latin typeface="Century Gothic"/>
+                          <a:cs typeface="Century Gothic"/>
+                        </a:rPr>
+                        <a:t>sag</a:t>
+                      </a:r>
+                      <a:endParaRPr lang="en-US" sz="2800" dirty="0">
+                        <a:solidFill>
+                          <a:schemeClr val="accent4">
+                            <a:lumMod val="50000"/>
                           </a:schemeClr>
                         </a:solidFill>
                         <a:latin typeface="Century Gothic"/>
@@ -8490,75 +8462,6 @@
                       <a:r>
                         <a:rPr lang="en-US" sz="2800" dirty="0" smtClean="0">
                           <a:solidFill>
-                            <a:schemeClr val="accent4">
-                              <a:lumMod val="50000"/>
-                            </a:schemeClr>
-                          </a:solidFill>
-                          <a:latin typeface="Century Gothic"/>
-                          <a:cs typeface="Century Gothic"/>
-                        </a:rPr>
-                        <a:t>award</a:t>
-                      </a:r>
-                      <a:endParaRPr lang="en-US" sz="2800" dirty="0">
-                        <a:solidFill>
-                          <a:schemeClr val="accent4">
-                            <a:lumMod val="50000"/>
-                          </a:schemeClr>
-                        </a:solidFill>
-                        <a:latin typeface="Century Gothic"/>
-                        <a:cs typeface="Century Gothic"/>
-                      </a:endParaRPr>
-                    </a:p>
-                  </a:txBody>
-                  <a:tcPr>
-                    <a:lnL w="12700" cap="flat" cmpd="sng" algn="ctr">
-                      <a:solidFill>
-                        <a:scrgbClr r="0" g="0" b="0"/>
-                      </a:solidFill>
-                      <a:prstDash val="solid"/>
-                      <a:round/>
-                      <a:headEnd type="none" w="med" len="med"/>
-                      <a:tailEnd type="none" w="med" len="med"/>
-                    </a:lnL>
-                    <a:lnR w="12700" cap="flat" cmpd="sng" algn="ctr">
-                      <a:solidFill>
-                        <a:scrgbClr r="0" g="0" b="0"/>
-                      </a:solidFill>
-                      <a:prstDash val="solid"/>
-                      <a:round/>
-                      <a:headEnd type="none" w="med" len="med"/>
-                      <a:tailEnd type="none" w="med" len="med"/>
-                    </a:lnR>
-                    <a:lnT w="12700" cap="flat" cmpd="sng" algn="ctr">
-                      <a:solidFill>
-                        <a:scrgbClr r="0" g="0" b="0"/>
-                      </a:solidFill>
-                      <a:prstDash val="solid"/>
-                      <a:round/>
-                      <a:headEnd type="none" w="med" len="med"/>
-                      <a:tailEnd type="none" w="med" len="med"/>
-                    </a:lnT>
-                    <a:lnB w="12700" cap="flat" cmpd="sng" algn="ctr">
-                      <a:solidFill>
-                        <a:scrgbClr r="0" g="0" b="0"/>
-                      </a:solidFill>
-                      <a:prstDash val="solid"/>
-                      <a:round/>
-                      <a:headEnd type="none" w="med" len="med"/>
-                      <a:tailEnd type="none" w="med" len="med"/>
-                    </a:lnB>
-                    <a:noFill/>
-                  </a:tcPr>
-                </a:tc>
-                <a:tc>
-                  <a:txBody>
-                    <a:bodyPr/>
-                    <a:lstStyle/>
-                    <a:p>
-                      <a:pPr algn="ctr"/>
-                      <a:r>
-                        <a:rPr lang="en-US" sz="2800" dirty="0" smtClean="0">
-                          <a:solidFill>
                             <a:schemeClr val="tx1">
                               <a:lumMod val="85000"/>
                               <a:lumOff val="15000"/>
@@ -8574,6 +8477,75 @@
                           <a:schemeClr val="tx1">
                             <a:lumMod val="85000"/>
                             <a:lumOff val="15000"/>
+                          </a:schemeClr>
+                        </a:solidFill>
+                        <a:latin typeface="Century Gothic"/>
+                        <a:cs typeface="Century Gothic"/>
+                      </a:endParaRPr>
+                    </a:p>
+                  </a:txBody>
+                  <a:tcPr>
+                    <a:lnL w="12700" cap="flat" cmpd="sng" algn="ctr">
+                      <a:solidFill>
+                        <a:scrgbClr r="0" g="0" b="0"/>
+                      </a:solidFill>
+                      <a:prstDash val="solid"/>
+                      <a:round/>
+                      <a:headEnd type="none" w="med" len="med"/>
+                      <a:tailEnd type="none" w="med" len="med"/>
+                    </a:lnL>
+                    <a:lnR w="12700" cap="flat" cmpd="sng" algn="ctr">
+                      <a:solidFill>
+                        <a:scrgbClr r="0" g="0" b="0"/>
+                      </a:solidFill>
+                      <a:prstDash val="solid"/>
+                      <a:round/>
+                      <a:headEnd type="none" w="med" len="med"/>
+                      <a:tailEnd type="none" w="med" len="med"/>
+                    </a:lnR>
+                    <a:lnT w="12700" cap="flat" cmpd="sng" algn="ctr">
+                      <a:solidFill>
+                        <a:scrgbClr r="0" g="0" b="0"/>
+                      </a:solidFill>
+                      <a:prstDash val="solid"/>
+                      <a:round/>
+                      <a:headEnd type="none" w="med" len="med"/>
+                      <a:tailEnd type="none" w="med" len="med"/>
+                    </a:lnT>
+                    <a:lnB w="12700" cap="flat" cmpd="sng" algn="ctr">
+                      <a:solidFill>
+                        <a:scrgbClr r="0" g="0" b="0"/>
+                      </a:solidFill>
+                      <a:prstDash val="solid"/>
+                      <a:round/>
+                      <a:headEnd type="none" w="med" len="med"/>
+                      <a:tailEnd type="none" w="med" len="med"/>
+                    </a:lnB>
+                    <a:noFill/>
+                  </a:tcPr>
+                </a:tc>
+                <a:tc>
+                  <a:txBody>
+                    <a:bodyPr/>
+                    <a:lstStyle/>
+                    <a:p>
+                      <a:pPr algn="ctr"/>
+                      <a:r>
+                        <a:rPr lang="en-US" sz="2800" dirty="0" smtClean="0">
+                          <a:solidFill>
+                            <a:schemeClr val="accent4">
+                              <a:lumMod val="50000"/>
+                            </a:schemeClr>
+                          </a:solidFill>
+                          <a:latin typeface="Century Gothic"/>
+                          <a:cs typeface="Century Gothic"/>
+                        </a:rPr>
+                        <a:t>award</a:t>
+                      </a:r>
+                      <a:endParaRPr lang="en-US" sz="2800" dirty="0">
+                        <a:solidFill>
+                          <a:schemeClr val="accent4">
+                            <a:lumMod val="50000"/>
                           </a:schemeClr>
                         </a:solidFill>
                         <a:latin typeface="Century Gothic"/>
@@ -8768,75 +8740,6 @@
                       <a:r>
                         <a:rPr lang="en-US" sz="2800" dirty="0" smtClean="0">
                           <a:solidFill>
-                            <a:schemeClr val="accent4">
-                              <a:lumMod val="50000"/>
-                            </a:schemeClr>
-                          </a:solidFill>
-                          <a:latin typeface="Century Gothic"/>
-                          <a:cs typeface="Century Gothic"/>
-                        </a:rPr>
-                        <a:t>receives</a:t>
-                      </a:r>
-                      <a:endParaRPr lang="en-US" sz="2800" dirty="0">
-                        <a:solidFill>
-                          <a:schemeClr val="accent4">
-                            <a:lumMod val="50000"/>
-                          </a:schemeClr>
-                        </a:solidFill>
-                        <a:latin typeface="Century Gothic"/>
-                        <a:cs typeface="Century Gothic"/>
-                      </a:endParaRPr>
-                    </a:p>
-                  </a:txBody>
-                  <a:tcPr>
-                    <a:lnL w="12700" cap="flat" cmpd="sng" algn="ctr">
-                      <a:solidFill>
-                        <a:scrgbClr r="0" g="0" b="0"/>
-                      </a:solidFill>
-                      <a:prstDash val="solid"/>
-                      <a:round/>
-                      <a:headEnd type="none" w="med" len="med"/>
-                      <a:tailEnd type="none" w="med" len="med"/>
-                    </a:lnL>
-                    <a:lnR w="12700" cap="flat" cmpd="sng" algn="ctr">
-                      <a:solidFill>
-                        <a:scrgbClr r="0" g="0" b="0"/>
-                      </a:solidFill>
-                      <a:prstDash val="solid"/>
-                      <a:round/>
-                      <a:headEnd type="none" w="med" len="med"/>
-                      <a:tailEnd type="none" w="med" len="med"/>
-                    </a:lnR>
-                    <a:lnT w="12700" cap="flat" cmpd="sng" algn="ctr">
-                      <a:solidFill>
-                        <a:scrgbClr r="0" g="0" b="0"/>
-                      </a:solidFill>
-                      <a:prstDash val="solid"/>
-                      <a:round/>
-                      <a:headEnd type="none" w="med" len="med"/>
-                      <a:tailEnd type="none" w="med" len="med"/>
-                    </a:lnT>
-                    <a:lnB w="12700" cap="flat" cmpd="sng" algn="ctr">
-                      <a:solidFill>
-                        <a:scrgbClr r="0" g="0" b="0"/>
-                      </a:solidFill>
-                      <a:prstDash val="solid"/>
-                      <a:round/>
-                      <a:headEnd type="none" w="med" len="med"/>
-                      <a:tailEnd type="none" w="med" len="med"/>
-                    </a:lnB>
-                    <a:noFill/>
-                  </a:tcPr>
-                </a:tc>
-                <a:tc>
-                  <a:txBody>
-                    <a:bodyPr/>
-                    <a:lstStyle/>
-                    <a:p>
-                      <a:pPr algn="ctr"/>
-                      <a:r>
-                        <a:rPr lang="en-US" sz="2800" dirty="0" smtClean="0">
-                          <a:solidFill>
                             <a:schemeClr val="tx1">
                               <a:lumMod val="85000"/>
                               <a:lumOff val="15000"/>
@@ -8852,6 +8755,75 @@
                           <a:schemeClr val="tx1">
                             <a:lumMod val="85000"/>
                             <a:lumOff val="15000"/>
+                          </a:schemeClr>
+                        </a:solidFill>
+                        <a:latin typeface="Century Gothic"/>
+                        <a:cs typeface="Century Gothic"/>
+                      </a:endParaRPr>
+                    </a:p>
+                  </a:txBody>
+                  <a:tcPr>
+                    <a:lnL w="12700" cap="flat" cmpd="sng" algn="ctr">
+                      <a:solidFill>
+                        <a:scrgbClr r="0" g="0" b="0"/>
+                      </a:solidFill>
+                      <a:prstDash val="solid"/>
+                      <a:round/>
+                      <a:headEnd type="none" w="med" len="med"/>
+                      <a:tailEnd type="none" w="med" len="med"/>
+                    </a:lnL>
+                    <a:lnR w="12700" cap="flat" cmpd="sng" algn="ctr">
+                      <a:solidFill>
+                        <a:scrgbClr r="0" g="0" b="0"/>
+                      </a:solidFill>
+                      <a:prstDash val="solid"/>
+                      <a:round/>
+                      <a:headEnd type="none" w="med" len="med"/>
+                      <a:tailEnd type="none" w="med" len="med"/>
+                    </a:lnR>
+                    <a:lnT w="12700" cap="flat" cmpd="sng" algn="ctr">
+                      <a:solidFill>
+                        <a:scrgbClr r="0" g="0" b="0"/>
+                      </a:solidFill>
+                      <a:prstDash val="solid"/>
+                      <a:round/>
+                      <a:headEnd type="none" w="med" len="med"/>
+                      <a:tailEnd type="none" w="med" len="med"/>
+                    </a:lnT>
+                    <a:lnB w="12700" cap="flat" cmpd="sng" algn="ctr">
+                      <a:solidFill>
+                        <a:scrgbClr r="0" g="0" b="0"/>
+                      </a:solidFill>
+                      <a:prstDash val="solid"/>
+                      <a:round/>
+                      <a:headEnd type="none" w="med" len="med"/>
+                      <a:tailEnd type="none" w="med" len="med"/>
+                    </a:lnB>
+                    <a:noFill/>
+                  </a:tcPr>
+                </a:tc>
+                <a:tc>
+                  <a:txBody>
+                    <a:bodyPr/>
+                    <a:lstStyle/>
+                    <a:p>
+                      <a:pPr algn="ctr"/>
+                      <a:r>
+                        <a:rPr lang="en-US" sz="2800" dirty="0" smtClean="0">
+                          <a:solidFill>
+                            <a:schemeClr val="accent4">
+                              <a:lumMod val="50000"/>
+                            </a:schemeClr>
+                          </a:solidFill>
+                          <a:latin typeface="Century Gothic"/>
+                          <a:cs typeface="Century Gothic"/>
+                        </a:rPr>
+                        <a:t>receives</a:t>
+                      </a:r>
+                      <a:endParaRPr lang="en-US" sz="2800" dirty="0">
+                        <a:solidFill>
+                          <a:schemeClr val="accent4">
+                            <a:lumMod val="50000"/>
                           </a:schemeClr>
                         </a:solidFill>
                         <a:latin typeface="Century Gothic"/>
@@ -9044,75 +9016,6 @@
                     <a:p>
                       <a:pPr algn="ctr"/>
                       <a:r>
-                        <a:rPr lang="en-US" sz="2800" dirty="0" smtClean="0">
-                          <a:solidFill>
-                            <a:schemeClr val="accent4">
-                              <a:lumMod val="50000"/>
-                            </a:schemeClr>
-                          </a:solidFill>
-                          <a:latin typeface="Century Gothic"/>
-                          <a:cs typeface="Century Gothic"/>
-                        </a:rPr>
-                        <a:t>best</a:t>
-                      </a:r>
-                      <a:endParaRPr lang="en-US" sz="2800" dirty="0">
-                        <a:solidFill>
-                          <a:schemeClr val="accent4">
-                            <a:lumMod val="50000"/>
-                          </a:schemeClr>
-                        </a:solidFill>
-                        <a:latin typeface="Century Gothic"/>
-                        <a:cs typeface="Century Gothic"/>
-                      </a:endParaRPr>
-                    </a:p>
-                  </a:txBody>
-                  <a:tcPr>
-                    <a:lnL w="12700" cap="flat" cmpd="sng" algn="ctr">
-                      <a:solidFill>
-                        <a:scrgbClr r="0" g="0" b="0"/>
-                      </a:solidFill>
-                      <a:prstDash val="solid"/>
-                      <a:round/>
-                      <a:headEnd type="none" w="med" len="med"/>
-                      <a:tailEnd type="none" w="med" len="med"/>
-                    </a:lnL>
-                    <a:lnR w="12700" cap="flat" cmpd="sng" algn="ctr">
-                      <a:solidFill>
-                        <a:scrgbClr r="0" g="0" b="0"/>
-                      </a:solidFill>
-                      <a:prstDash val="solid"/>
-                      <a:round/>
-                      <a:headEnd type="none" w="med" len="med"/>
-                      <a:tailEnd type="none" w="med" len="med"/>
-                    </a:lnR>
-                    <a:lnT w="12700" cap="flat" cmpd="sng" algn="ctr">
-                      <a:solidFill>
-                        <a:scrgbClr r="0" g="0" b="0"/>
-                      </a:solidFill>
-                      <a:prstDash val="solid"/>
-                      <a:round/>
-                      <a:headEnd type="none" w="med" len="med"/>
-                      <a:tailEnd type="none" w="med" len="med"/>
-                    </a:lnT>
-                    <a:lnB w="12700" cap="flat" cmpd="sng" algn="ctr">
-                      <a:solidFill>
-                        <a:scrgbClr r="0" g="0" b="0"/>
-                      </a:solidFill>
-                      <a:prstDash val="solid"/>
-                      <a:round/>
-                      <a:headEnd type="none" w="med" len="med"/>
-                      <a:tailEnd type="none" w="med" len="med"/>
-                    </a:lnB>
-                    <a:noFill/>
-                  </a:tcPr>
-                </a:tc>
-                <a:tc>
-                  <a:txBody>
-                    <a:bodyPr/>
-                    <a:lstStyle/>
-                    <a:p>
-                      <a:pPr algn="ctr"/>
-                      <a:r>
                         <a:rPr lang="en-US" sz="2800" dirty="0" err="1" smtClean="0">
                           <a:solidFill>
                             <a:schemeClr val="tx1">
@@ -9130,6 +9033,75 @@
                           <a:schemeClr val="tx1">
                             <a:lumMod val="85000"/>
                             <a:lumOff val="15000"/>
+                          </a:schemeClr>
+                        </a:solidFill>
+                        <a:latin typeface="Century Gothic"/>
+                        <a:cs typeface="Century Gothic"/>
+                      </a:endParaRPr>
+                    </a:p>
+                  </a:txBody>
+                  <a:tcPr>
+                    <a:lnL w="12700" cap="flat" cmpd="sng" algn="ctr">
+                      <a:solidFill>
+                        <a:scrgbClr r="0" g="0" b="0"/>
+                      </a:solidFill>
+                      <a:prstDash val="solid"/>
+                      <a:round/>
+                      <a:headEnd type="none" w="med" len="med"/>
+                      <a:tailEnd type="none" w="med" len="med"/>
+                    </a:lnL>
+                    <a:lnR w="12700" cap="flat" cmpd="sng" algn="ctr">
+                      <a:solidFill>
+                        <a:scrgbClr r="0" g="0" b="0"/>
+                      </a:solidFill>
+                      <a:prstDash val="solid"/>
+                      <a:round/>
+                      <a:headEnd type="none" w="med" len="med"/>
+                      <a:tailEnd type="none" w="med" len="med"/>
+                    </a:lnR>
+                    <a:lnT w="12700" cap="flat" cmpd="sng" algn="ctr">
+                      <a:solidFill>
+                        <a:scrgbClr r="0" g="0" b="0"/>
+                      </a:solidFill>
+                      <a:prstDash val="solid"/>
+                      <a:round/>
+                      <a:headEnd type="none" w="med" len="med"/>
+                      <a:tailEnd type="none" w="med" len="med"/>
+                    </a:lnT>
+                    <a:lnB w="12700" cap="flat" cmpd="sng" algn="ctr">
+                      <a:solidFill>
+                        <a:scrgbClr r="0" g="0" b="0"/>
+                      </a:solidFill>
+                      <a:prstDash val="solid"/>
+                      <a:round/>
+                      <a:headEnd type="none" w="med" len="med"/>
+                      <a:tailEnd type="none" w="med" len="med"/>
+                    </a:lnB>
+                    <a:noFill/>
+                  </a:tcPr>
+                </a:tc>
+                <a:tc>
+                  <a:txBody>
+                    <a:bodyPr/>
+                    <a:lstStyle/>
+                    <a:p>
+                      <a:pPr algn="ctr"/>
+                      <a:r>
+                        <a:rPr lang="en-US" sz="2800" dirty="0" smtClean="0">
+                          <a:solidFill>
+                            <a:schemeClr val="accent4">
+                              <a:lumMod val="50000"/>
+                            </a:schemeClr>
+                          </a:solidFill>
+                          <a:latin typeface="Century Gothic"/>
+                          <a:cs typeface="Century Gothic"/>
+                        </a:rPr>
+                        <a:t>best</a:t>
+                      </a:r>
+                      <a:endParaRPr lang="en-US" sz="2800" dirty="0">
+                        <a:solidFill>
+                          <a:schemeClr val="accent4">
+                            <a:lumMod val="50000"/>
                           </a:schemeClr>
                         </a:solidFill>
                         <a:latin typeface="Century Gothic"/>
@@ -9322,75 +9294,6 @@
                     <a:p>
                       <a:pPr algn="ctr"/>
                       <a:r>
-                        <a:rPr lang="en-US" sz="2800" dirty="0" smtClean="0">
-                          <a:solidFill>
-                            <a:schemeClr val="accent4">
-                              <a:lumMod val="50000"/>
-                            </a:schemeClr>
-                          </a:solidFill>
-                          <a:latin typeface="Century Gothic"/>
-                          <a:cs typeface="Century Gothic"/>
-                        </a:rPr>
-                        <a:t>wins</a:t>
-                      </a:r>
-                      <a:endParaRPr lang="en-US" sz="2800" dirty="0">
-                        <a:solidFill>
-                          <a:schemeClr val="accent4">
-                            <a:lumMod val="50000"/>
-                          </a:schemeClr>
-                        </a:solidFill>
-                        <a:latin typeface="Century Gothic"/>
-                        <a:cs typeface="Century Gothic"/>
-                      </a:endParaRPr>
-                    </a:p>
-                  </a:txBody>
-                  <a:tcPr>
-                    <a:lnL w="12700" cap="flat" cmpd="sng" algn="ctr">
-                      <a:solidFill>
-                        <a:scrgbClr r="0" g="0" b="0"/>
-                      </a:solidFill>
-                      <a:prstDash val="solid"/>
-                      <a:round/>
-                      <a:headEnd type="none" w="med" len="med"/>
-                      <a:tailEnd type="none" w="med" len="med"/>
-                    </a:lnL>
-                    <a:lnR w="12700" cap="flat" cmpd="sng" algn="ctr">
-                      <a:solidFill>
-                        <a:scrgbClr r="0" g="0" b="0"/>
-                      </a:solidFill>
-                      <a:prstDash val="solid"/>
-                      <a:round/>
-                      <a:headEnd type="none" w="med" len="med"/>
-                      <a:tailEnd type="none" w="med" len="med"/>
-                    </a:lnR>
-                    <a:lnT w="12700" cap="flat" cmpd="sng" algn="ctr">
-                      <a:solidFill>
-                        <a:scrgbClr r="0" g="0" b="0"/>
-                      </a:solidFill>
-                      <a:prstDash val="solid"/>
-                      <a:round/>
-                      <a:headEnd type="none" w="med" len="med"/>
-                      <a:tailEnd type="none" w="med" len="med"/>
-                    </a:lnT>
-                    <a:lnB w="12700" cap="flat" cmpd="sng" algn="ctr">
-                      <a:solidFill>
-                        <a:scrgbClr r="0" g="0" b="0"/>
-                      </a:solidFill>
-                      <a:prstDash val="solid"/>
-                      <a:round/>
-                      <a:headEnd type="none" w="med" len="med"/>
-                      <a:tailEnd type="none" w="med" len="med"/>
-                    </a:lnB>
-                    <a:noFill/>
-                  </a:tcPr>
-                </a:tc>
-                <a:tc>
-                  <a:txBody>
-                    <a:bodyPr/>
-                    <a:lstStyle/>
-                    <a:p>
-                      <a:pPr algn="ctr"/>
-                      <a:r>
                         <a:rPr lang="en-US" sz="2800" b="1" dirty="0" smtClean="0">
                           <a:solidFill>
                             <a:schemeClr val="tx1">
@@ -9408,6 +9311,75 @@
                           <a:schemeClr val="tx1">
                             <a:lumMod val="85000"/>
                             <a:lumOff val="15000"/>
+                          </a:schemeClr>
+                        </a:solidFill>
+                        <a:latin typeface="Century Gothic"/>
+                        <a:cs typeface="Century Gothic"/>
+                      </a:endParaRPr>
+                    </a:p>
+                  </a:txBody>
+                  <a:tcPr>
+                    <a:lnL w="12700" cap="flat" cmpd="sng" algn="ctr">
+                      <a:solidFill>
+                        <a:scrgbClr r="0" g="0" b="0"/>
+                      </a:solidFill>
+                      <a:prstDash val="solid"/>
+                      <a:round/>
+                      <a:headEnd type="none" w="med" len="med"/>
+                      <a:tailEnd type="none" w="med" len="med"/>
+                    </a:lnL>
+                    <a:lnR w="12700" cap="flat" cmpd="sng" algn="ctr">
+                      <a:solidFill>
+                        <a:scrgbClr r="0" g="0" b="0"/>
+                      </a:solidFill>
+                      <a:prstDash val="solid"/>
+                      <a:round/>
+                      <a:headEnd type="none" w="med" len="med"/>
+                      <a:tailEnd type="none" w="med" len="med"/>
+                    </a:lnR>
+                    <a:lnT w="12700" cap="flat" cmpd="sng" algn="ctr">
+                      <a:solidFill>
+                        <a:scrgbClr r="0" g="0" b="0"/>
+                      </a:solidFill>
+                      <a:prstDash val="solid"/>
+                      <a:round/>
+                      <a:headEnd type="none" w="med" len="med"/>
+                      <a:tailEnd type="none" w="med" len="med"/>
+                    </a:lnT>
+                    <a:lnB w="12700" cap="flat" cmpd="sng" algn="ctr">
+                      <a:solidFill>
+                        <a:scrgbClr r="0" g="0" b="0"/>
+                      </a:solidFill>
+                      <a:prstDash val="solid"/>
+                      <a:round/>
+                      <a:headEnd type="none" w="med" len="med"/>
+                      <a:tailEnd type="none" w="med" len="med"/>
+                    </a:lnB>
+                    <a:noFill/>
+                  </a:tcPr>
+                </a:tc>
+                <a:tc>
+                  <a:txBody>
+                    <a:bodyPr/>
+                    <a:lstStyle/>
+                    <a:p>
+                      <a:pPr algn="ctr"/>
+                      <a:r>
+                        <a:rPr lang="en-US" sz="2800" dirty="0" smtClean="0">
+                          <a:solidFill>
+                            <a:schemeClr val="accent4">
+                              <a:lumMod val="50000"/>
+                            </a:schemeClr>
+                          </a:solidFill>
+                          <a:latin typeface="Century Gothic"/>
+                          <a:cs typeface="Century Gothic"/>
+                        </a:rPr>
+                        <a:t>wins</a:t>
+                      </a:r>
+                      <a:endParaRPr lang="en-US" sz="2800" dirty="0">
+                        <a:solidFill>
+                          <a:schemeClr val="accent4">
+                            <a:lumMod val="50000"/>
                           </a:schemeClr>
                         </a:solidFill>
                         <a:latin typeface="Century Gothic"/>
@@ -9600,75 +9572,6 @@
                     <a:p>
                       <a:pPr algn="ctr"/>
                       <a:r>
-                        <a:rPr lang="en-US" sz="2800" dirty="0" smtClean="0">
-                          <a:solidFill>
-                            <a:schemeClr val="accent4">
-                              <a:lumMod val="50000"/>
-                            </a:schemeClr>
-                          </a:solidFill>
-                          <a:latin typeface="Century Gothic"/>
-                          <a:cs typeface="Century Gothic"/>
-                        </a:rPr>
-                        <a:t>winning</a:t>
-                      </a:r>
-                      <a:endParaRPr lang="en-US" sz="2800" dirty="0">
-                        <a:solidFill>
-                          <a:schemeClr val="accent4">
-                            <a:lumMod val="50000"/>
-                          </a:schemeClr>
-                        </a:solidFill>
-                        <a:latin typeface="Century Gothic"/>
-                        <a:cs typeface="Century Gothic"/>
-                      </a:endParaRPr>
-                    </a:p>
-                  </a:txBody>
-                  <a:tcPr>
-                    <a:lnL w="12700" cap="flat" cmpd="sng" algn="ctr">
-                      <a:solidFill>
-                        <a:scrgbClr r="0" g="0" b="0"/>
-                      </a:solidFill>
-                      <a:prstDash val="solid"/>
-                      <a:round/>
-                      <a:headEnd type="none" w="med" len="med"/>
-                      <a:tailEnd type="none" w="med" len="med"/>
-                    </a:lnL>
-                    <a:lnR w="12700" cap="flat" cmpd="sng" algn="ctr">
-                      <a:solidFill>
-                        <a:scrgbClr r="0" g="0" b="0"/>
-                      </a:solidFill>
-                      <a:prstDash val="solid"/>
-                      <a:round/>
-                      <a:headEnd type="none" w="med" len="med"/>
-                      <a:tailEnd type="none" w="med" len="med"/>
-                    </a:lnR>
-                    <a:lnT w="12700" cap="flat" cmpd="sng" algn="ctr">
-                      <a:solidFill>
-                        <a:scrgbClr r="0" g="0" b="0"/>
-                      </a:solidFill>
-                      <a:prstDash val="solid"/>
-                      <a:round/>
-                      <a:headEnd type="none" w="med" len="med"/>
-                      <a:tailEnd type="none" w="med" len="med"/>
-                    </a:lnT>
-                    <a:lnB w="12700" cap="flat" cmpd="sng" algn="ctr">
-                      <a:solidFill>
-                        <a:scrgbClr r="0" g="0" b="0"/>
-                      </a:solidFill>
-                      <a:prstDash val="solid"/>
-                      <a:round/>
-                      <a:headEnd type="none" w="med" len="med"/>
-                      <a:tailEnd type="none" w="med" len="med"/>
-                    </a:lnB>
-                    <a:noFill/>
-                  </a:tcPr>
-                </a:tc>
-                <a:tc>
-                  <a:txBody>
-                    <a:bodyPr/>
-                    <a:lstStyle/>
-                    <a:p>
-                      <a:pPr algn="ctr"/>
-                      <a:r>
                         <a:rPr lang="en-US" sz="2800" b="1" dirty="0" smtClean="0">
                           <a:solidFill>
                             <a:schemeClr val="tx1">
@@ -9686,6 +9589,75 @@
                           <a:schemeClr val="tx1">
                             <a:lumMod val="85000"/>
                             <a:lumOff val="15000"/>
+                          </a:schemeClr>
+                        </a:solidFill>
+                        <a:latin typeface="Century Gothic"/>
+                        <a:cs typeface="Century Gothic"/>
+                      </a:endParaRPr>
+                    </a:p>
+                  </a:txBody>
+                  <a:tcPr>
+                    <a:lnL w="12700" cap="flat" cmpd="sng" algn="ctr">
+                      <a:solidFill>
+                        <a:scrgbClr r="0" g="0" b="0"/>
+                      </a:solidFill>
+                      <a:prstDash val="solid"/>
+                      <a:round/>
+                      <a:headEnd type="none" w="med" len="med"/>
+                      <a:tailEnd type="none" w="med" len="med"/>
+                    </a:lnL>
+                    <a:lnR w="12700" cap="flat" cmpd="sng" algn="ctr">
+                      <a:solidFill>
+                        <a:scrgbClr r="0" g="0" b="0"/>
+                      </a:solidFill>
+                      <a:prstDash val="solid"/>
+                      <a:round/>
+                      <a:headEnd type="none" w="med" len="med"/>
+                      <a:tailEnd type="none" w="med" len="med"/>
+                    </a:lnR>
+                    <a:lnT w="12700" cap="flat" cmpd="sng" algn="ctr">
+                      <a:solidFill>
+                        <a:scrgbClr r="0" g="0" b="0"/>
+                      </a:solidFill>
+                      <a:prstDash val="solid"/>
+                      <a:round/>
+                      <a:headEnd type="none" w="med" len="med"/>
+                      <a:tailEnd type="none" w="med" len="med"/>
+                    </a:lnT>
+                    <a:lnB w="12700" cap="flat" cmpd="sng" algn="ctr">
+                      <a:solidFill>
+                        <a:scrgbClr r="0" g="0" b="0"/>
+                      </a:solidFill>
+                      <a:prstDash val="solid"/>
+                      <a:round/>
+                      <a:headEnd type="none" w="med" len="med"/>
+                      <a:tailEnd type="none" w="med" len="med"/>
+                    </a:lnB>
+                    <a:noFill/>
+                  </a:tcPr>
+                </a:tc>
+                <a:tc>
+                  <a:txBody>
+                    <a:bodyPr/>
+                    <a:lstStyle/>
+                    <a:p>
+                      <a:pPr algn="ctr"/>
+                      <a:r>
+                        <a:rPr lang="en-US" sz="2800" dirty="0" smtClean="0">
+                          <a:solidFill>
+                            <a:schemeClr val="accent4">
+                              <a:lumMod val="50000"/>
+                            </a:schemeClr>
+                          </a:solidFill>
+                          <a:latin typeface="Century Gothic"/>
+                          <a:cs typeface="Century Gothic"/>
+                        </a:rPr>
+                        <a:t>winning</a:t>
+                      </a:r>
+                      <a:endParaRPr lang="en-US" sz="2800" dirty="0">
+                        <a:solidFill>
+                          <a:schemeClr val="accent4">
+                            <a:lumMod val="50000"/>
                           </a:schemeClr>
                         </a:solidFill>
                         <a:latin typeface="Century Gothic"/>
@@ -9880,75 +9852,6 @@
                       <a:r>
                         <a:rPr lang="en-US" sz="2800" b="1" dirty="0" smtClean="0">
                           <a:solidFill>
-                            <a:schemeClr val="accent4">
-                              <a:lumMod val="50000"/>
-                            </a:schemeClr>
-                          </a:solidFill>
-                          <a:latin typeface="Century Gothic"/>
-                          <a:cs typeface="Century Gothic"/>
-                        </a:rPr>
-                        <a:t>ensemble</a:t>
-                      </a:r>
-                      <a:endParaRPr lang="en-US" sz="2800" b="1" dirty="0">
-                        <a:solidFill>
-                          <a:schemeClr val="accent4">
-                            <a:lumMod val="50000"/>
-                          </a:schemeClr>
-                        </a:solidFill>
-                        <a:latin typeface="Century Gothic"/>
-                        <a:cs typeface="Century Gothic"/>
-                      </a:endParaRPr>
-                    </a:p>
-                  </a:txBody>
-                  <a:tcPr>
-                    <a:lnL w="12700" cap="flat" cmpd="sng" algn="ctr">
-                      <a:solidFill>
-                        <a:scrgbClr r="0" g="0" b="0"/>
-                      </a:solidFill>
-                      <a:prstDash val="solid"/>
-                      <a:round/>
-                      <a:headEnd type="none" w="med" len="med"/>
-                      <a:tailEnd type="none" w="med" len="med"/>
-                    </a:lnL>
-                    <a:lnR w="12700" cap="flat" cmpd="sng" algn="ctr">
-                      <a:solidFill>
-                        <a:scrgbClr r="0" g="0" b="0"/>
-                      </a:solidFill>
-                      <a:prstDash val="solid"/>
-                      <a:round/>
-                      <a:headEnd type="none" w="med" len="med"/>
-                      <a:tailEnd type="none" w="med" len="med"/>
-                    </a:lnR>
-                    <a:lnT w="12700" cap="flat" cmpd="sng" algn="ctr">
-                      <a:solidFill>
-                        <a:scrgbClr r="0" g="0" b="0"/>
-                      </a:solidFill>
-                      <a:prstDash val="solid"/>
-                      <a:round/>
-                      <a:headEnd type="none" w="med" len="med"/>
-                      <a:tailEnd type="none" w="med" len="med"/>
-                    </a:lnT>
-                    <a:lnB w="12700" cap="flat" cmpd="sng" algn="ctr">
-                      <a:solidFill>
-                        <a:scrgbClr r="0" g="0" b="0"/>
-                      </a:solidFill>
-                      <a:prstDash val="solid"/>
-                      <a:round/>
-                      <a:headEnd type="none" w="med" len="med"/>
-                      <a:tailEnd type="none" w="med" len="med"/>
-                    </a:lnB>
-                    <a:noFill/>
-                  </a:tcPr>
-                </a:tc>
-                <a:tc>
-                  <a:txBody>
-                    <a:bodyPr/>
-                    <a:lstStyle/>
-                    <a:p>
-                      <a:pPr algn="ctr"/>
-                      <a:r>
-                        <a:rPr lang="en-US" sz="2800" b="1" dirty="0" smtClean="0">
-                          <a:solidFill>
                             <a:schemeClr val="tx1">
                               <a:lumMod val="85000"/>
                               <a:lumOff val="15000"/>
@@ -9964,6 +9867,75 @@
                           <a:schemeClr val="tx1">
                             <a:lumMod val="85000"/>
                             <a:lumOff val="15000"/>
+                          </a:schemeClr>
+                        </a:solidFill>
+                        <a:latin typeface="Century Gothic"/>
+                        <a:cs typeface="Century Gothic"/>
+                      </a:endParaRPr>
+                    </a:p>
+                  </a:txBody>
+                  <a:tcPr>
+                    <a:lnL w="12700" cap="flat" cmpd="sng" algn="ctr">
+                      <a:solidFill>
+                        <a:scrgbClr r="0" g="0" b="0"/>
+                      </a:solidFill>
+                      <a:prstDash val="solid"/>
+                      <a:round/>
+                      <a:headEnd type="none" w="med" len="med"/>
+                      <a:tailEnd type="none" w="med" len="med"/>
+                    </a:lnL>
+                    <a:lnR w="12700" cap="flat" cmpd="sng" algn="ctr">
+                      <a:solidFill>
+                        <a:scrgbClr r="0" g="0" b="0"/>
+                      </a:solidFill>
+                      <a:prstDash val="solid"/>
+                      <a:round/>
+                      <a:headEnd type="none" w="med" len="med"/>
+                      <a:tailEnd type="none" w="med" len="med"/>
+                    </a:lnR>
+                    <a:lnT w="12700" cap="flat" cmpd="sng" algn="ctr">
+                      <a:solidFill>
+                        <a:scrgbClr r="0" g="0" b="0"/>
+                      </a:solidFill>
+                      <a:prstDash val="solid"/>
+                      <a:round/>
+                      <a:headEnd type="none" w="med" len="med"/>
+                      <a:tailEnd type="none" w="med" len="med"/>
+                    </a:lnT>
+                    <a:lnB w="12700" cap="flat" cmpd="sng" algn="ctr">
+                      <a:solidFill>
+                        <a:scrgbClr r="0" g="0" b="0"/>
+                      </a:solidFill>
+                      <a:prstDash val="solid"/>
+                      <a:round/>
+                      <a:headEnd type="none" w="med" len="med"/>
+                      <a:tailEnd type="none" w="med" len="med"/>
+                    </a:lnB>
+                    <a:noFill/>
+                  </a:tcPr>
+                </a:tc>
+                <a:tc>
+                  <a:txBody>
+                    <a:bodyPr/>
+                    <a:lstStyle/>
+                    <a:p>
+                      <a:pPr algn="ctr"/>
+                      <a:r>
+                        <a:rPr lang="en-US" sz="2800" b="1" dirty="0" smtClean="0">
+                          <a:solidFill>
+                            <a:schemeClr val="accent4">
+                              <a:lumMod val="50000"/>
+                            </a:schemeClr>
+                          </a:solidFill>
+                          <a:latin typeface="Century Gothic"/>
+                          <a:cs typeface="Century Gothic"/>
+                        </a:rPr>
+                        <a:t>ensemble</a:t>
+                      </a:r>
+                      <a:endParaRPr lang="en-US" sz="2800" b="1" dirty="0">
+                        <a:solidFill>
+                          <a:schemeClr val="accent4">
+                            <a:lumMod val="50000"/>
                           </a:schemeClr>
                         </a:solidFill>
                         <a:latin typeface="Century Gothic"/>
@@ -10587,7 +10559,7 @@
         </p:blipFill>
         <p:spPr bwMode="auto">
           <a:xfrm>
-            <a:off x="9366349" y="21789561"/>
+            <a:off x="9520285" y="21808803"/>
             <a:ext cx="2638313" cy="3640860"/>
           </a:xfrm>
           <a:prstGeom prst="rect">
@@ -10690,8 +10662,8 @@
         </p:blipFill>
         <p:spPr>
           <a:xfrm>
-            <a:off x="8998694" y="25763606"/>
-            <a:ext cx="3278942" cy="2385320"/>
+            <a:off x="9081165" y="25779872"/>
+            <a:ext cx="3364894" cy="2447847"/>
           </a:xfrm>
           <a:prstGeom prst="rect">
             <a:avLst/>
@@ -10719,7 +10691,7 @@
         </p:blipFill>
         <p:spPr>
           <a:xfrm>
-            <a:off x="8883903" y="28587886"/>
+            <a:off x="9172533" y="28433950"/>
             <a:ext cx="3304204" cy="2675676"/>
           </a:xfrm>
           <a:prstGeom prst="rect">
@@ -10748,7 +10720,7 @@
         </p:blipFill>
         <p:spPr>
           <a:xfrm>
-            <a:off x="24485057" y="25583599"/>
+            <a:off x="24331121" y="25583599"/>
             <a:ext cx="2862275" cy="2412515"/>
           </a:xfrm>
           <a:prstGeom prst="rect">
@@ -10777,7 +10749,7 @@
         </p:blipFill>
         <p:spPr>
           <a:xfrm>
-            <a:off x="24383998" y="28376278"/>
+            <a:off x="24364756" y="28376278"/>
             <a:ext cx="2743201" cy="2453124"/>
           </a:xfrm>
           <a:prstGeom prst="rect">
@@ -11677,7 +11649,7 @@
           <a:prstGeom prst="straightConnector1">
             <a:avLst/>
           </a:prstGeom>
-          <a:ln>
+          <a:ln w="76200" cmpd="sng">
             <a:solidFill>
               <a:schemeClr val="tx1">
                 <a:lumMod val="85000"/>
@@ -11858,6 +11830,106 @@
           </a:prstGeom>
         </p:spPr>
       </p:pic>
+      <p:sp>
+        <p:nvSpPr>
+          <p:cNvPr id="2" name="Rectangle 1"/>
+          <p:cNvSpPr/>
+          <p:nvPr/>
+        </p:nvSpPr>
+        <p:spPr>
+          <a:xfrm>
+            <a:off x="24148819" y="21667468"/>
+            <a:ext cx="3140787" cy="9289331"/>
+          </a:xfrm>
+          <a:prstGeom prst="rect">
+            <a:avLst/>
+          </a:prstGeom>
+          <a:noFill/>
+          <a:ln>
+            <a:solidFill>
+              <a:schemeClr val="accent4">
+                <a:lumMod val="75000"/>
+              </a:schemeClr>
+            </a:solidFill>
+          </a:ln>
+        </p:spPr>
+        <p:style>
+          <a:lnRef idx="1">
+            <a:schemeClr val="accent1"/>
+          </a:lnRef>
+          <a:fillRef idx="3">
+            <a:schemeClr val="accent1"/>
+          </a:fillRef>
+          <a:effectRef idx="2">
+            <a:schemeClr val="accent1"/>
+          </a:effectRef>
+          <a:fontRef idx="minor">
+            <a:schemeClr val="lt1"/>
+          </a:fontRef>
+        </p:style>
+        <p:txBody>
+          <a:bodyPr rtlCol="0" anchor="ctr"/>
+          <a:lstStyle/>
+          <a:p>
+            <a:pPr algn="ctr"/>
+            <a:endParaRPr lang="en-US"/>
+          </a:p>
+        </p:txBody>
+      </p:sp>
+      <p:sp>
+        <p:nvSpPr>
+          <p:cNvPr id="72" name="Rectangle 71"/>
+          <p:cNvSpPr/>
+          <p:nvPr/>
+        </p:nvSpPr>
+        <p:spPr>
+          <a:xfrm>
+            <a:off x="9258996" y="21671802"/>
+            <a:ext cx="3140787" cy="9289331"/>
+          </a:xfrm>
+          <a:prstGeom prst="rect">
+            <a:avLst/>
+          </a:prstGeom>
+          <a:noFill/>
+          <a:ln>
+            <a:solidFill>
+              <a:schemeClr val="tx1">
+                <a:lumMod val="85000"/>
+                <a:lumOff val="15000"/>
+              </a:schemeClr>
+            </a:solidFill>
+          </a:ln>
+        </p:spPr>
+        <p:style>
+          <a:lnRef idx="1">
+            <a:schemeClr val="accent1"/>
+          </a:lnRef>
+          <a:fillRef idx="3">
+            <a:schemeClr val="accent1"/>
+          </a:fillRef>
+          <a:effectRef idx="2">
+            <a:schemeClr val="accent1"/>
+          </a:effectRef>
+          <a:fontRef idx="minor">
+            <a:schemeClr val="lt1"/>
+          </a:fontRef>
+        </p:style>
+        <p:txBody>
+          <a:bodyPr rtlCol="0" anchor="ctr"/>
+          <a:lstStyle/>
+          <a:p>
+            <a:pPr algn="ctr"/>
+            <a:endParaRPr lang="en-US">
+              <a:solidFill>
+                <a:schemeClr val="tx1">
+                  <a:lumMod val="75000"/>
+                  <a:lumOff val="25000"/>
+                </a:schemeClr>
+              </a:solidFill>
+            </a:endParaRPr>
+          </a:p>
+        </p:txBody>
+      </p:sp>
     </p:spTree>
     <p:extLst>
       <p:ext uri="{BB962C8B-B14F-4D97-AF65-F5344CB8AC3E}">

</xml_diff>

<commit_message>
add the word trend to each arrow
</commit_message>
<xml_diff>
--- a/poster/OscarsPosterTemplateWhite.pptx
+++ b/poster/OscarsPosterTemplateWhite.pptx
@@ -112,7 +112,7 @@
   </p:defaultTextStyle>
   <p:extLst>
     <p:ext uri="{EFAFB233-063F-42B5-8137-9DF3F51BA10A}">
-      <p15:sldGuideLst xmlns="" xmlns:p15="http://schemas.microsoft.com/office/powerpoint/2012/main">
+      <p15:sldGuideLst xmlns:p15="http://schemas.microsoft.com/office/powerpoint/2012/main" xmlns="">
         <p15:guide id="1" orient="horz" pos="3318">
           <p15:clr>
             <a:srgbClr val="A4A3A4"/>
@@ -166,7 +166,7 @@
       </p15:sldGuideLst>
     </p:ext>
     <p:ext uri="{2D200454-40CA-4A62-9FC3-DE9A4176ACB9}">
-      <p15:notesGuideLst xmlns="" xmlns:p15="http://schemas.microsoft.com/office/powerpoint/2012/main">
+      <p15:notesGuideLst xmlns:p15="http://schemas.microsoft.com/office/powerpoint/2012/main" xmlns="">
         <p15:guide id="1" orient="horz" pos="13681">
           <p15:clr>
             <a:srgbClr val="A4A3A4"/>
@@ -3168,7 +3168,7 @@
               <a:graphicData uri="http://schemas.openxmlformats.org/presentationml/2006/ole">
                 <mc:AlternateContent xmlns:mc="http://schemas.openxmlformats.org/markup-compatibility/2006">
                   <mc:Choice xmlns:v="urn:schemas-microsoft-com:vml" Requires="v">
-                    <p:oleObj spid="_x0000_s1386" name="Image" r:id="rId8" imgW="1828440" imgH="1117440" progId="Photoshop.Image.13">
+                    <p:oleObj spid="_x0000_s1403" name="Image" r:id="rId8" imgW="1828440" imgH="1117440" progId="Photoshop.Image.13">
                       <p:embed/>
                     </p:oleObj>
                   </mc:Choice>
@@ -3225,7 +3225,7 @@
               <a:graphicData uri="http://schemas.openxmlformats.org/presentationml/2006/ole">
                 <mc:AlternateContent xmlns:mc="http://schemas.openxmlformats.org/markup-compatibility/2006">
                   <mc:Choice xmlns:v="urn:schemas-microsoft-com:vml" Requires="v">
-                    <p:oleObj spid="_x0000_s1387" name="Image" r:id="rId10" imgW="1828440" imgH="1117440" progId="Photoshop.Image.13">
+                    <p:oleObj spid="_x0000_s1404" name="Image" r:id="rId10" imgW="1828440" imgH="1117440" progId="Photoshop.Image.13">
                       <p:embed/>
                     </p:oleObj>
                   </mc:Choice>
@@ -4353,7 +4353,7 @@
             <a:graphicData uri="http://schemas.openxmlformats.org/presentationml/2006/ole">
               <mc:AlternateContent xmlns:mc="http://schemas.openxmlformats.org/markup-compatibility/2006">
                 <mc:Choice xmlns:v="urn:schemas-microsoft-com:vml" Requires="v">
-                  <p:oleObj spid="_x0000_s1388" name="Image" r:id="rId12" imgW="4571280" imgH="1688760" progId="Photoshop.Image.13">
+                  <p:oleObj spid="_x0000_s1405" name="Image" r:id="rId12" imgW="4571280" imgH="1688760" progId="Photoshop.Image.13">
                     <p:embed/>
                   </p:oleObj>
                 </mc:Choice>
@@ -4437,7 +4437,7 @@
             <a:graphicData uri="http://schemas.openxmlformats.org/presentationml/2006/ole">
               <mc:AlternateContent xmlns:mc="http://schemas.openxmlformats.org/markup-compatibility/2006">
                 <mc:Choice xmlns:v="urn:schemas-microsoft-com:vml" Requires="v">
-                  <p:oleObj spid="_x0000_s1389" name="Image" r:id="rId15" imgW="1574280" imgH="1053720" progId="Photoshop.Image.13">
+                  <p:oleObj spid="_x0000_s1406" name="Image" r:id="rId15" imgW="1574280" imgH="1053720" progId="Photoshop.Image.13">
                     <p:embed/>
                   </p:oleObj>
                 </mc:Choice>
@@ -11644,17 +11644,14 @@
         <p:spPr>
           <a:xfrm>
             <a:off x="39935839" y="17292320"/>
-            <a:ext cx="1476321" cy="1046480"/>
+            <a:ext cx="1467177" cy="1046480"/>
           </a:xfrm>
           <a:prstGeom prst="straightConnector1">
             <a:avLst/>
           </a:prstGeom>
-          <a:ln w="76200" cmpd="sng">
+          <a:ln w="28575" cmpd="sng">
             <a:solidFill>
-              <a:schemeClr val="tx1">
-                <a:lumMod val="85000"/>
-                <a:lumOff val="15000"/>
-              </a:schemeClr>
+              <a:srgbClr val="000000"/>
             </a:solidFill>
             <a:tailEnd type="arrow"/>
           </a:ln>
@@ -11770,7 +11767,7 @@
         <p:spPr>
           <a:xfrm>
             <a:off x="35900582" y="24384000"/>
-            <a:ext cx="1356138" cy="396240"/>
+            <a:ext cx="1356138" cy="302663"/>
           </a:xfrm>
           <a:prstGeom prst="straightConnector1">
             <a:avLst/>
@@ -11926,6 +11923,186 @@
                   <a:lumOff val="25000"/>
                 </a:schemeClr>
               </a:solidFill>
+            </a:endParaRPr>
+          </a:p>
+        </p:txBody>
+      </p:sp>
+      <p:sp>
+        <p:nvSpPr>
+          <p:cNvPr id="3" name="TextBox 2"/>
+          <p:cNvSpPr txBox="1"/>
+          <p:nvPr/>
+        </p:nvSpPr>
+        <p:spPr>
+          <a:xfrm rot="1289298">
+            <a:off x="5105400" y="25918346"/>
+            <a:ext cx="846531" cy="400110"/>
+          </a:xfrm>
+          <a:prstGeom prst="rect">
+            <a:avLst/>
+          </a:prstGeom>
+          <a:noFill/>
+        </p:spPr>
+        <p:txBody>
+          <a:bodyPr wrap="none" rtlCol="0">
+            <a:spAutoFit/>
+          </a:bodyPr>
+          <a:lstStyle/>
+          <a:p>
+            <a:r>
+              <a:rPr lang="en-US" sz="2000" dirty="0" smtClean="0">
+                <a:latin typeface="Century Gothic"/>
+                <a:cs typeface="Century Gothic"/>
+              </a:rPr>
+              <a:t>trend</a:t>
+            </a:r>
+            <a:endParaRPr lang="en-US" sz="2000" dirty="0">
+              <a:latin typeface="Century Gothic"/>
+              <a:cs typeface="Century Gothic"/>
+            </a:endParaRPr>
+          </a:p>
+        </p:txBody>
+      </p:sp>
+      <p:sp>
+        <p:nvSpPr>
+          <p:cNvPr id="70" name="TextBox 69"/>
+          <p:cNvSpPr txBox="1"/>
+          <p:nvPr/>
+        </p:nvSpPr>
+        <p:spPr>
+          <a:xfrm rot="19233521">
+            <a:off x="13923578" y="16230861"/>
+            <a:ext cx="647971" cy="307777"/>
+          </a:xfrm>
+          <a:prstGeom prst="rect">
+            <a:avLst/>
+          </a:prstGeom>
+          <a:noFill/>
+        </p:spPr>
+        <p:txBody>
+          <a:bodyPr wrap="none" rtlCol="0">
+            <a:spAutoFit/>
+          </a:bodyPr>
+          <a:lstStyle/>
+          <a:p>
+            <a:r>
+              <a:rPr lang="en-US" sz="1400" dirty="0" smtClean="0">
+                <a:latin typeface="Century Gothic"/>
+                <a:cs typeface="Century Gothic"/>
+              </a:rPr>
+              <a:t>trend</a:t>
+            </a:r>
+            <a:endParaRPr lang="en-US" sz="1400" dirty="0">
+              <a:latin typeface="Century Gothic"/>
+              <a:cs typeface="Century Gothic"/>
+            </a:endParaRPr>
+          </a:p>
+        </p:txBody>
+      </p:sp>
+      <p:sp>
+        <p:nvSpPr>
+          <p:cNvPr id="74" name="TextBox 73"/>
+          <p:cNvSpPr txBox="1"/>
+          <p:nvPr/>
+        </p:nvSpPr>
+        <p:spPr>
+          <a:xfrm rot="19008967">
+            <a:off x="30994811" y="16827177"/>
+            <a:ext cx="647971" cy="307777"/>
+          </a:xfrm>
+          <a:prstGeom prst="rect">
+            <a:avLst/>
+          </a:prstGeom>
+          <a:noFill/>
+        </p:spPr>
+        <p:txBody>
+          <a:bodyPr wrap="none" rtlCol="0">
+            <a:spAutoFit/>
+          </a:bodyPr>
+          <a:lstStyle/>
+          <a:p>
+            <a:r>
+              <a:rPr lang="en-US" sz="1400" dirty="0" smtClean="0">
+                <a:latin typeface="Century Gothic"/>
+                <a:cs typeface="Century Gothic"/>
+              </a:rPr>
+              <a:t>trend</a:t>
+            </a:r>
+            <a:endParaRPr lang="en-US" sz="1400" dirty="0">
+              <a:latin typeface="Century Gothic"/>
+              <a:cs typeface="Century Gothic"/>
+            </a:endParaRPr>
+          </a:p>
+        </p:txBody>
+      </p:sp>
+      <p:sp>
+        <p:nvSpPr>
+          <p:cNvPr id="75" name="TextBox 74"/>
+          <p:cNvSpPr txBox="1"/>
+          <p:nvPr/>
+        </p:nvSpPr>
+        <p:spPr>
+          <a:xfrm rot="2179078">
+            <a:off x="40428698" y="17558503"/>
+            <a:ext cx="647971" cy="307777"/>
+          </a:xfrm>
+          <a:prstGeom prst="rect">
+            <a:avLst/>
+          </a:prstGeom>
+          <a:noFill/>
+        </p:spPr>
+        <p:txBody>
+          <a:bodyPr wrap="none" rtlCol="0">
+            <a:spAutoFit/>
+          </a:bodyPr>
+          <a:lstStyle/>
+          <a:p>
+            <a:r>
+              <a:rPr lang="en-US" sz="1400" dirty="0" smtClean="0">
+                <a:latin typeface="Century Gothic"/>
+                <a:cs typeface="Century Gothic"/>
+              </a:rPr>
+              <a:t>trend</a:t>
+            </a:r>
+            <a:endParaRPr lang="en-US" sz="1400" dirty="0">
+              <a:latin typeface="Century Gothic"/>
+              <a:cs typeface="Century Gothic"/>
+            </a:endParaRPr>
+          </a:p>
+        </p:txBody>
+      </p:sp>
+      <p:sp>
+        <p:nvSpPr>
+          <p:cNvPr id="76" name="TextBox 75"/>
+          <p:cNvSpPr txBox="1"/>
+          <p:nvPr/>
+        </p:nvSpPr>
+        <p:spPr>
+          <a:xfrm rot="817056">
+            <a:off x="36287219" y="24203143"/>
+            <a:ext cx="647971" cy="307777"/>
+          </a:xfrm>
+          <a:prstGeom prst="rect">
+            <a:avLst/>
+          </a:prstGeom>
+          <a:noFill/>
+        </p:spPr>
+        <p:txBody>
+          <a:bodyPr wrap="none" rtlCol="0">
+            <a:spAutoFit/>
+          </a:bodyPr>
+          <a:lstStyle/>
+          <a:p>
+            <a:r>
+              <a:rPr lang="en-US" sz="1400" dirty="0" smtClean="0">
+                <a:latin typeface="Century Gothic"/>
+                <a:cs typeface="Century Gothic"/>
+              </a:rPr>
+              <a:t>trend</a:t>
+            </a:r>
+            <a:endParaRPr lang="en-US" sz="1400" dirty="0">
+              <a:latin typeface="Century Gothic"/>
+              <a:cs typeface="Century Gothic"/>
             </a:endParaRPr>
           </a:p>
         </p:txBody>

</xml_diff>

<commit_message>
add winner to poster
</commit_message>
<xml_diff>
--- a/poster/OscarsPosterTemplateWhite.pptx
+++ b/poster/OscarsPosterTemplateWhite.pptx
@@ -112,7 +112,7 @@
   </p:defaultTextStyle>
   <p:extLst>
     <p:ext uri="{EFAFB233-063F-42B5-8137-9DF3F51BA10A}">
-      <p15:sldGuideLst xmlns:p15="http://schemas.microsoft.com/office/powerpoint/2012/main" xmlns="">
+      <p15:sldGuideLst xmlns="" xmlns:p15="http://schemas.microsoft.com/office/powerpoint/2012/main">
         <p15:guide id="1" orient="horz" pos="3318">
           <p15:clr>
             <a:srgbClr val="A4A3A4"/>
@@ -166,7 +166,7 @@
       </p15:sldGuideLst>
     </p:ext>
     <p:ext uri="{2D200454-40CA-4A62-9FC3-DE9A4176ACB9}">
-      <p15:notesGuideLst xmlns:p15="http://schemas.microsoft.com/office/powerpoint/2012/main" xmlns="">
+      <p15:notesGuideLst xmlns="" xmlns:p15="http://schemas.microsoft.com/office/powerpoint/2012/main">
         <p15:guide id="1" orient="horz" pos="13681">
           <p15:clr>
             <a:srgbClr val="A4A3A4"/>
@@ -274,7 +274,7 @@
           <a:p>
             <a:fld id="{EEA57C38-CC48-9E45-83F9-10BA72A97108}" type="datetimeFigureOut">
               <a:rPr lang="en-US" smtClean="0"/>
-              <a:t>2/22/16</a:t>
+              <a:t>3/1/16</a:t>
             </a:fld>
             <a:endParaRPr lang="en-US"/>
           </a:p>
@@ -440,7 +440,7 @@
             <a:fld id="{E6CC2317-6751-4CD4-9995-8782DD78E936}" type="datetimeFigureOut">
               <a:rPr lang="en-US" smtClean="0"/>
               <a:pPr/>
-              <a:t>2/22/16</a:t>
+              <a:t>3/1/16</a:t>
             </a:fld>
             <a:endParaRPr lang="en-US" dirty="0"/>
           </a:p>
@@ -3168,7 +3168,7 @@
               <a:graphicData uri="http://schemas.openxmlformats.org/presentationml/2006/ole">
                 <mc:AlternateContent xmlns:mc="http://schemas.openxmlformats.org/markup-compatibility/2006">
                   <mc:Choice xmlns:v="urn:schemas-microsoft-com:vml" Requires="v">
-                    <p:oleObj spid="_x0000_s1403" name="Image" r:id="rId8" imgW="1828440" imgH="1117440" progId="Photoshop.Image.13">
+                    <p:oleObj spid="_x0000_s1408" name="Image" r:id="rId8" imgW="1828440" imgH="1117440" progId="Photoshop.Image.13">
                       <p:embed/>
                     </p:oleObj>
                   </mc:Choice>
@@ -3225,7 +3225,7 @@
               <a:graphicData uri="http://schemas.openxmlformats.org/presentationml/2006/ole">
                 <mc:AlternateContent xmlns:mc="http://schemas.openxmlformats.org/markup-compatibility/2006">
                   <mc:Choice xmlns:v="urn:schemas-microsoft-com:vml" Requires="v">
-                    <p:oleObj spid="_x0000_s1404" name="Image" r:id="rId10" imgW="1828440" imgH="1117440" progId="Photoshop.Image.13">
+                    <p:oleObj spid="_x0000_s1409" name="Image" r:id="rId10" imgW="1828440" imgH="1117440" progId="Photoshop.Image.13">
                       <p:embed/>
                     </p:oleObj>
                   </mc:Choice>
@@ -4353,7 +4353,7 @@
             <a:graphicData uri="http://schemas.openxmlformats.org/presentationml/2006/ole">
               <mc:AlternateContent xmlns:mc="http://schemas.openxmlformats.org/markup-compatibility/2006">
                 <mc:Choice xmlns:v="urn:schemas-microsoft-com:vml" Requires="v">
-                  <p:oleObj spid="_x0000_s1405" name="Image" r:id="rId12" imgW="4571280" imgH="1688760" progId="Photoshop.Image.13">
+                  <p:oleObj spid="_x0000_s1410" name="Image" r:id="rId12" imgW="4571280" imgH="1688760" progId="Photoshop.Image.13">
                     <p:embed/>
                   </p:oleObj>
                 </mc:Choice>
@@ -4437,7 +4437,7 @@
             <a:graphicData uri="http://schemas.openxmlformats.org/presentationml/2006/ole">
               <mc:AlternateContent xmlns:mc="http://schemas.openxmlformats.org/markup-compatibility/2006">
                 <mc:Choice xmlns:v="urn:schemas-microsoft-com:vml" Requires="v">
-                  <p:oleObj spid="_x0000_s1406" name="Image" r:id="rId15" imgW="1574280" imgH="1053720" progId="Photoshop.Image.13">
+                  <p:oleObj spid="_x0000_s1411" name="Image" r:id="rId15" imgW="1574280" imgH="1053720" progId="Photoshop.Image.13">
                     <p:embed/>
                   </p:oleObj>
                 </mc:Choice>
@@ -6147,8 +6147,31 @@
                 <a:latin typeface="Century Gothic"/>
                 <a:cs typeface="Century Gothic"/>
               </a:rPr>
-              <a:t>And the Oscar goes to _____________________... What movie do you think will win?</a:t>
+              <a:t>Spotlight won Best Picture on 2/28/2016. Our analysis suggested this was a </a:t>
             </a:r>
+            <a:r>
+              <a:rPr lang="en-US" sz="2800" b="1" smtClean="0">
+                <a:solidFill>
+                  <a:schemeClr val="tx1">
+                    <a:lumMod val="85000"/>
+                    <a:lumOff val="15000"/>
+                  </a:schemeClr>
+                </a:solidFill>
+                <a:latin typeface="Century Gothic"/>
+                <a:cs typeface="Century Gothic"/>
+              </a:rPr>
+              <a:t>likely winner.</a:t>
+            </a:r>
+            <a:endParaRPr lang="en-US" sz="2800" b="1" dirty="0" smtClean="0">
+              <a:solidFill>
+                <a:schemeClr val="tx1">
+                  <a:lumMod val="85000"/>
+                  <a:lumOff val="15000"/>
+                </a:schemeClr>
+              </a:solidFill>
+              <a:latin typeface="Century Gothic"/>
+              <a:cs typeface="Century Gothic"/>
+            </a:endParaRPr>
           </a:p>
         </p:txBody>
       </p:sp>

</xml_diff>